<commit_message>
Se actualiza el README.md, la presentación y el archivo de diagrama ajustando correcciones de escritura
</commit_message>
<xml_diff>
--- a/presentacion solucion.pptx
+++ b/presentacion solucion.pptx
@@ -116,6 +116,3164 @@
     </p:ext>
   </p:extLst>
 </p:presentation>
+</file>
+
+<file path=ppt/diagrams/colors1.xml><?xml version="1.0" encoding="utf-8"?>
+<dgm:colorsDef xmlns:dgm="http://schemas.openxmlformats.org/drawingml/2006/diagram" xmlns:a="http://schemas.openxmlformats.org/drawingml/2006/main" uniqueId="urn:microsoft.com/office/officeart/2005/8/colors/accent1_2">
+  <dgm:title val=""/>
+  <dgm:desc val=""/>
+  <dgm:catLst>
+    <dgm:cat type="accent1" pri="11200"/>
+  </dgm:catLst>
+  <dgm:styleLbl name="node0">
+    <dgm:fillClrLst meth="repeat">
+      <a:schemeClr val="accent1"/>
+    </dgm:fillClrLst>
+    <dgm:linClrLst meth="repeat">
+      <a:schemeClr val="lt1"/>
+    </dgm:linClrLst>
+    <dgm:effectClrLst/>
+    <dgm:txLinClrLst/>
+    <dgm:txFillClrLst/>
+    <dgm:txEffectClrLst/>
+  </dgm:styleLbl>
+  <dgm:styleLbl name="alignNode1">
+    <dgm:fillClrLst meth="repeat">
+      <a:schemeClr val="accent1"/>
+    </dgm:fillClrLst>
+    <dgm:linClrLst meth="repeat">
+      <a:schemeClr val="accent1"/>
+    </dgm:linClrLst>
+    <dgm:effectClrLst/>
+    <dgm:txLinClrLst/>
+    <dgm:txFillClrLst/>
+    <dgm:txEffectClrLst/>
+  </dgm:styleLbl>
+  <dgm:styleLbl name="node1">
+    <dgm:fillClrLst meth="repeat">
+      <a:schemeClr val="accent1"/>
+    </dgm:fillClrLst>
+    <dgm:linClrLst meth="repeat">
+      <a:schemeClr val="lt1"/>
+    </dgm:linClrLst>
+    <dgm:effectClrLst/>
+    <dgm:txLinClrLst/>
+    <dgm:txFillClrLst/>
+    <dgm:txEffectClrLst/>
+  </dgm:styleLbl>
+  <dgm:styleLbl name="lnNode1">
+    <dgm:fillClrLst meth="repeat">
+      <a:schemeClr val="accent1"/>
+    </dgm:fillClrLst>
+    <dgm:linClrLst meth="repeat">
+      <a:schemeClr val="lt1"/>
+    </dgm:linClrLst>
+    <dgm:effectClrLst/>
+    <dgm:txLinClrLst/>
+    <dgm:txFillClrLst/>
+    <dgm:txEffectClrLst/>
+  </dgm:styleLbl>
+  <dgm:styleLbl name="vennNode1">
+    <dgm:fillClrLst meth="repeat">
+      <a:schemeClr val="accent1">
+        <a:alpha val="50000"/>
+      </a:schemeClr>
+    </dgm:fillClrLst>
+    <dgm:linClrLst meth="repeat">
+      <a:schemeClr val="lt1"/>
+    </dgm:linClrLst>
+    <dgm:effectClrLst/>
+    <dgm:txLinClrLst/>
+    <dgm:txFillClrLst/>
+    <dgm:txEffectClrLst/>
+  </dgm:styleLbl>
+  <dgm:styleLbl name="node2">
+    <dgm:fillClrLst meth="repeat">
+      <a:schemeClr val="accent1"/>
+    </dgm:fillClrLst>
+    <dgm:linClrLst meth="repeat">
+      <a:schemeClr val="lt1"/>
+    </dgm:linClrLst>
+    <dgm:effectClrLst/>
+    <dgm:txLinClrLst/>
+    <dgm:txFillClrLst/>
+    <dgm:txEffectClrLst/>
+  </dgm:styleLbl>
+  <dgm:styleLbl name="node3">
+    <dgm:fillClrLst meth="repeat">
+      <a:schemeClr val="accent1"/>
+    </dgm:fillClrLst>
+    <dgm:linClrLst meth="repeat">
+      <a:schemeClr val="lt1"/>
+    </dgm:linClrLst>
+    <dgm:effectClrLst/>
+    <dgm:txLinClrLst/>
+    <dgm:txFillClrLst/>
+    <dgm:txEffectClrLst/>
+  </dgm:styleLbl>
+  <dgm:styleLbl name="node4">
+    <dgm:fillClrLst meth="repeat">
+      <a:schemeClr val="accent1"/>
+    </dgm:fillClrLst>
+    <dgm:linClrLst meth="repeat">
+      <a:schemeClr val="lt1"/>
+    </dgm:linClrLst>
+    <dgm:effectClrLst/>
+    <dgm:txLinClrLst/>
+    <dgm:txFillClrLst/>
+    <dgm:txEffectClrLst/>
+  </dgm:styleLbl>
+  <dgm:styleLbl name="fgImgPlace1">
+    <dgm:fillClrLst meth="repeat">
+      <a:schemeClr val="accent1">
+        <a:tint val="50000"/>
+      </a:schemeClr>
+    </dgm:fillClrLst>
+    <dgm:linClrLst meth="repeat">
+      <a:schemeClr val="lt1"/>
+    </dgm:linClrLst>
+    <dgm:effectClrLst/>
+    <dgm:txLinClrLst/>
+    <dgm:txFillClrLst meth="repeat">
+      <a:schemeClr val="lt1"/>
+    </dgm:txFillClrLst>
+    <dgm:txEffectClrLst/>
+  </dgm:styleLbl>
+  <dgm:styleLbl name="alignImgPlace1">
+    <dgm:fillClrLst meth="repeat">
+      <a:schemeClr val="accent1">
+        <a:tint val="50000"/>
+      </a:schemeClr>
+    </dgm:fillClrLst>
+    <dgm:linClrLst meth="repeat">
+      <a:schemeClr val="lt1"/>
+    </dgm:linClrLst>
+    <dgm:effectClrLst/>
+    <dgm:txLinClrLst/>
+    <dgm:txFillClrLst meth="repeat">
+      <a:schemeClr val="lt1"/>
+    </dgm:txFillClrLst>
+    <dgm:txEffectClrLst/>
+  </dgm:styleLbl>
+  <dgm:styleLbl name="bgImgPlace1">
+    <dgm:fillClrLst meth="repeat">
+      <a:schemeClr val="accent1">
+        <a:tint val="50000"/>
+      </a:schemeClr>
+    </dgm:fillClrLst>
+    <dgm:linClrLst meth="repeat">
+      <a:schemeClr val="lt1"/>
+    </dgm:linClrLst>
+    <dgm:effectClrLst/>
+    <dgm:txLinClrLst/>
+    <dgm:txFillClrLst meth="repeat">
+      <a:schemeClr val="lt1"/>
+    </dgm:txFillClrLst>
+    <dgm:txEffectClrLst/>
+  </dgm:styleLbl>
+  <dgm:styleLbl name="sibTrans2D1">
+    <dgm:fillClrLst meth="repeat">
+      <a:schemeClr val="accent1">
+        <a:tint val="60000"/>
+      </a:schemeClr>
+    </dgm:fillClrLst>
+    <dgm:linClrLst meth="repeat">
+      <a:schemeClr val="accent1">
+        <a:tint val="60000"/>
+      </a:schemeClr>
+    </dgm:linClrLst>
+    <dgm:effectClrLst/>
+    <dgm:txLinClrLst/>
+    <dgm:txFillClrLst/>
+    <dgm:txEffectClrLst/>
+  </dgm:styleLbl>
+  <dgm:styleLbl name="fgSibTrans2D1">
+    <dgm:fillClrLst meth="repeat">
+      <a:schemeClr val="accent1">
+        <a:tint val="60000"/>
+      </a:schemeClr>
+    </dgm:fillClrLst>
+    <dgm:linClrLst meth="repeat">
+      <a:schemeClr val="accent1">
+        <a:tint val="60000"/>
+      </a:schemeClr>
+    </dgm:linClrLst>
+    <dgm:effectClrLst/>
+    <dgm:txLinClrLst/>
+    <dgm:txFillClrLst/>
+    <dgm:txEffectClrLst/>
+  </dgm:styleLbl>
+  <dgm:styleLbl name="bgSibTrans2D1">
+    <dgm:fillClrLst meth="repeat">
+      <a:schemeClr val="accent1">
+        <a:tint val="60000"/>
+      </a:schemeClr>
+    </dgm:fillClrLst>
+    <dgm:linClrLst meth="repeat">
+      <a:schemeClr val="accent1">
+        <a:tint val="60000"/>
+      </a:schemeClr>
+    </dgm:linClrLst>
+    <dgm:effectClrLst/>
+    <dgm:txLinClrLst/>
+    <dgm:txFillClrLst/>
+    <dgm:txEffectClrLst/>
+  </dgm:styleLbl>
+  <dgm:styleLbl name="sibTrans1D1">
+    <dgm:fillClrLst meth="repeat">
+      <a:schemeClr val="accent1"/>
+    </dgm:fillClrLst>
+    <dgm:linClrLst meth="repeat">
+      <a:schemeClr val="accent1"/>
+    </dgm:linClrLst>
+    <dgm:effectClrLst/>
+    <dgm:txLinClrLst/>
+    <dgm:txFillClrLst meth="repeat">
+      <a:schemeClr val="tx1"/>
+    </dgm:txFillClrLst>
+    <dgm:txEffectClrLst/>
+  </dgm:styleLbl>
+  <dgm:styleLbl name="callout">
+    <dgm:fillClrLst meth="repeat">
+      <a:schemeClr val="accent1"/>
+    </dgm:fillClrLst>
+    <dgm:linClrLst meth="repeat">
+      <a:schemeClr val="accent1">
+        <a:tint val="50000"/>
+      </a:schemeClr>
+    </dgm:linClrLst>
+    <dgm:effectClrLst/>
+    <dgm:txLinClrLst/>
+    <dgm:txFillClrLst meth="repeat">
+      <a:schemeClr val="tx1"/>
+    </dgm:txFillClrLst>
+    <dgm:txEffectClrLst/>
+  </dgm:styleLbl>
+  <dgm:styleLbl name="asst0">
+    <dgm:fillClrLst meth="repeat">
+      <a:schemeClr val="accent1"/>
+    </dgm:fillClrLst>
+    <dgm:linClrLst meth="repeat">
+      <a:schemeClr val="lt1"/>
+    </dgm:linClrLst>
+    <dgm:effectClrLst/>
+    <dgm:txLinClrLst/>
+    <dgm:txFillClrLst/>
+    <dgm:txEffectClrLst/>
+  </dgm:styleLbl>
+  <dgm:styleLbl name="asst1">
+    <dgm:fillClrLst meth="repeat">
+      <a:schemeClr val="accent1"/>
+    </dgm:fillClrLst>
+    <dgm:linClrLst meth="repeat">
+      <a:schemeClr val="lt1"/>
+    </dgm:linClrLst>
+    <dgm:effectClrLst/>
+    <dgm:txLinClrLst/>
+    <dgm:txFillClrLst/>
+    <dgm:txEffectClrLst/>
+  </dgm:styleLbl>
+  <dgm:styleLbl name="asst2">
+    <dgm:fillClrLst meth="repeat">
+      <a:schemeClr val="accent1"/>
+    </dgm:fillClrLst>
+    <dgm:linClrLst meth="repeat">
+      <a:schemeClr val="lt1"/>
+    </dgm:linClrLst>
+    <dgm:effectClrLst/>
+    <dgm:txLinClrLst/>
+    <dgm:txFillClrLst/>
+    <dgm:txEffectClrLst/>
+  </dgm:styleLbl>
+  <dgm:styleLbl name="asst3">
+    <dgm:fillClrLst meth="repeat">
+      <a:schemeClr val="accent1"/>
+    </dgm:fillClrLst>
+    <dgm:linClrLst meth="repeat">
+      <a:schemeClr val="lt1"/>
+    </dgm:linClrLst>
+    <dgm:effectClrLst/>
+    <dgm:txLinClrLst/>
+    <dgm:txFillClrLst/>
+    <dgm:txEffectClrLst/>
+  </dgm:styleLbl>
+  <dgm:styleLbl name="asst4">
+    <dgm:fillClrLst meth="repeat">
+      <a:schemeClr val="accent1"/>
+    </dgm:fillClrLst>
+    <dgm:linClrLst meth="repeat">
+      <a:schemeClr val="lt1"/>
+    </dgm:linClrLst>
+    <dgm:effectClrLst/>
+    <dgm:txLinClrLst/>
+    <dgm:txFillClrLst/>
+    <dgm:txEffectClrLst/>
+  </dgm:styleLbl>
+  <dgm:styleLbl name="parChTrans2D1">
+    <dgm:fillClrLst meth="repeat">
+      <a:schemeClr val="accent1">
+        <a:tint val="60000"/>
+      </a:schemeClr>
+    </dgm:fillClrLst>
+    <dgm:linClrLst meth="repeat">
+      <a:schemeClr val="accent1">
+        <a:tint val="60000"/>
+      </a:schemeClr>
+    </dgm:linClrLst>
+    <dgm:effectClrLst/>
+    <dgm:txLinClrLst/>
+    <dgm:txFillClrLst meth="repeat">
+      <a:schemeClr val="lt1"/>
+    </dgm:txFillClrLst>
+    <dgm:txEffectClrLst/>
+  </dgm:styleLbl>
+  <dgm:styleLbl name="parChTrans2D2">
+    <dgm:fillClrLst meth="repeat">
+      <a:schemeClr val="accent1"/>
+    </dgm:fillClrLst>
+    <dgm:linClrLst meth="repeat">
+      <a:schemeClr val="accent1"/>
+    </dgm:linClrLst>
+    <dgm:effectClrLst/>
+    <dgm:txLinClrLst/>
+    <dgm:txFillClrLst meth="repeat">
+      <a:schemeClr val="lt1"/>
+    </dgm:txFillClrLst>
+    <dgm:txEffectClrLst/>
+  </dgm:styleLbl>
+  <dgm:styleLbl name="parChTrans2D3">
+    <dgm:fillClrLst meth="repeat">
+      <a:schemeClr val="accent1"/>
+    </dgm:fillClrLst>
+    <dgm:linClrLst meth="repeat">
+      <a:schemeClr val="accent1"/>
+    </dgm:linClrLst>
+    <dgm:effectClrLst/>
+    <dgm:txLinClrLst/>
+    <dgm:txFillClrLst meth="repeat">
+      <a:schemeClr val="lt1"/>
+    </dgm:txFillClrLst>
+    <dgm:txEffectClrLst/>
+  </dgm:styleLbl>
+  <dgm:styleLbl name="parChTrans2D4">
+    <dgm:fillClrLst meth="repeat">
+      <a:schemeClr val="accent1"/>
+    </dgm:fillClrLst>
+    <dgm:linClrLst meth="repeat">
+      <a:schemeClr val="accent1"/>
+    </dgm:linClrLst>
+    <dgm:effectClrLst/>
+    <dgm:txLinClrLst/>
+    <dgm:txFillClrLst meth="repeat">
+      <a:schemeClr val="lt1"/>
+    </dgm:txFillClrLst>
+    <dgm:txEffectClrLst/>
+  </dgm:styleLbl>
+  <dgm:styleLbl name="parChTrans1D1">
+    <dgm:fillClrLst meth="repeat">
+      <a:schemeClr val="accent1"/>
+    </dgm:fillClrLst>
+    <dgm:linClrLst meth="repeat">
+      <a:schemeClr val="accent1">
+        <a:shade val="60000"/>
+      </a:schemeClr>
+    </dgm:linClrLst>
+    <dgm:effectClrLst/>
+    <dgm:txLinClrLst/>
+    <dgm:txFillClrLst meth="repeat">
+      <a:schemeClr val="tx1"/>
+    </dgm:txFillClrLst>
+    <dgm:txEffectClrLst/>
+  </dgm:styleLbl>
+  <dgm:styleLbl name="parChTrans1D2">
+    <dgm:fillClrLst meth="repeat">
+      <a:schemeClr val="accent1"/>
+    </dgm:fillClrLst>
+    <dgm:linClrLst meth="repeat">
+      <a:schemeClr val="accent1">
+        <a:shade val="60000"/>
+      </a:schemeClr>
+    </dgm:linClrLst>
+    <dgm:effectClrLst/>
+    <dgm:txLinClrLst/>
+    <dgm:txFillClrLst meth="repeat">
+      <a:schemeClr val="tx1"/>
+    </dgm:txFillClrLst>
+    <dgm:txEffectClrLst/>
+  </dgm:styleLbl>
+  <dgm:styleLbl name="parChTrans1D3">
+    <dgm:fillClrLst meth="repeat">
+      <a:schemeClr val="accent1"/>
+    </dgm:fillClrLst>
+    <dgm:linClrLst meth="repeat">
+      <a:schemeClr val="accent1">
+        <a:shade val="80000"/>
+      </a:schemeClr>
+    </dgm:linClrLst>
+    <dgm:effectClrLst/>
+    <dgm:txLinClrLst/>
+    <dgm:txFillClrLst meth="repeat">
+      <a:schemeClr val="tx1"/>
+    </dgm:txFillClrLst>
+    <dgm:txEffectClrLst/>
+  </dgm:styleLbl>
+  <dgm:styleLbl name="parChTrans1D4">
+    <dgm:fillClrLst meth="repeat">
+      <a:schemeClr val="accent1"/>
+    </dgm:fillClrLst>
+    <dgm:linClrLst meth="repeat">
+      <a:schemeClr val="accent1">
+        <a:shade val="80000"/>
+      </a:schemeClr>
+    </dgm:linClrLst>
+    <dgm:effectClrLst/>
+    <dgm:txLinClrLst/>
+    <dgm:txFillClrLst meth="repeat">
+      <a:schemeClr val="tx1"/>
+    </dgm:txFillClrLst>
+    <dgm:txEffectClrLst/>
+  </dgm:styleLbl>
+  <dgm:styleLbl name="fgAcc1">
+    <dgm:fillClrLst meth="repeat">
+      <a:schemeClr val="lt1">
+        <a:alpha val="90000"/>
+      </a:schemeClr>
+    </dgm:fillClrLst>
+    <dgm:linClrLst meth="repeat">
+      <a:schemeClr val="accent1"/>
+    </dgm:linClrLst>
+    <dgm:effectClrLst/>
+    <dgm:txLinClrLst/>
+    <dgm:txFillClrLst meth="repeat">
+      <a:schemeClr val="dk1"/>
+    </dgm:txFillClrLst>
+    <dgm:txEffectClrLst/>
+  </dgm:styleLbl>
+  <dgm:styleLbl name="conFgAcc1">
+    <dgm:fillClrLst meth="repeat">
+      <a:schemeClr val="lt1">
+        <a:alpha val="90000"/>
+      </a:schemeClr>
+    </dgm:fillClrLst>
+    <dgm:linClrLst meth="repeat">
+      <a:schemeClr val="accent1"/>
+    </dgm:linClrLst>
+    <dgm:effectClrLst/>
+    <dgm:txLinClrLst/>
+    <dgm:txFillClrLst meth="repeat">
+      <a:schemeClr val="dk1"/>
+    </dgm:txFillClrLst>
+    <dgm:txEffectClrLst/>
+  </dgm:styleLbl>
+  <dgm:styleLbl name="alignAcc1">
+    <dgm:fillClrLst meth="repeat">
+      <a:schemeClr val="lt1">
+        <a:alpha val="90000"/>
+      </a:schemeClr>
+    </dgm:fillClrLst>
+    <dgm:linClrLst meth="repeat">
+      <a:schemeClr val="accent1"/>
+    </dgm:linClrLst>
+    <dgm:effectClrLst/>
+    <dgm:txLinClrLst/>
+    <dgm:txFillClrLst meth="repeat">
+      <a:schemeClr val="dk1"/>
+    </dgm:txFillClrLst>
+    <dgm:txEffectClrLst/>
+  </dgm:styleLbl>
+  <dgm:styleLbl name="trAlignAcc1">
+    <dgm:fillClrLst meth="repeat">
+      <a:schemeClr val="lt1">
+        <a:alpha val="40000"/>
+      </a:schemeClr>
+    </dgm:fillClrLst>
+    <dgm:linClrLst meth="repeat">
+      <a:schemeClr val="accent1"/>
+    </dgm:linClrLst>
+    <dgm:effectClrLst/>
+    <dgm:txLinClrLst/>
+    <dgm:txFillClrLst meth="repeat">
+      <a:schemeClr val="dk1"/>
+    </dgm:txFillClrLst>
+    <dgm:txEffectClrLst/>
+  </dgm:styleLbl>
+  <dgm:styleLbl name="bgAcc1">
+    <dgm:fillClrLst meth="repeat">
+      <a:schemeClr val="lt1">
+        <a:alpha val="90000"/>
+      </a:schemeClr>
+    </dgm:fillClrLst>
+    <dgm:linClrLst meth="repeat">
+      <a:schemeClr val="accent1"/>
+    </dgm:linClrLst>
+    <dgm:effectClrLst/>
+    <dgm:txLinClrLst/>
+    <dgm:txFillClrLst meth="repeat">
+      <a:schemeClr val="dk1"/>
+    </dgm:txFillClrLst>
+    <dgm:txEffectClrLst/>
+  </dgm:styleLbl>
+  <dgm:styleLbl name="solidFgAcc1">
+    <dgm:fillClrLst meth="repeat">
+      <a:schemeClr val="lt1"/>
+    </dgm:fillClrLst>
+    <dgm:linClrLst meth="repeat">
+      <a:schemeClr val="accent1"/>
+    </dgm:linClrLst>
+    <dgm:effectClrLst/>
+    <dgm:txLinClrLst/>
+    <dgm:txFillClrLst meth="repeat">
+      <a:schemeClr val="dk1"/>
+    </dgm:txFillClrLst>
+    <dgm:txEffectClrLst/>
+  </dgm:styleLbl>
+  <dgm:styleLbl name="solidAlignAcc1">
+    <dgm:fillClrLst meth="repeat">
+      <a:schemeClr val="lt1"/>
+    </dgm:fillClrLst>
+    <dgm:linClrLst meth="repeat">
+      <a:schemeClr val="accent1"/>
+    </dgm:linClrLst>
+    <dgm:effectClrLst/>
+    <dgm:txLinClrLst/>
+    <dgm:txFillClrLst meth="repeat">
+      <a:schemeClr val="dk1"/>
+    </dgm:txFillClrLst>
+    <dgm:txEffectClrLst/>
+  </dgm:styleLbl>
+  <dgm:styleLbl name="solidBgAcc1">
+    <dgm:fillClrLst meth="repeat">
+      <a:schemeClr val="lt1"/>
+    </dgm:fillClrLst>
+    <dgm:linClrLst meth="repeat">
+      <a:schemeClr val="accent1"/>
+    </dgm:linClrLst>
+    <dgm:effectClrLst/>
+    <dgm:txLinClrLst/>
+    <dgm:txFillClrLst meth="repeat">
+      <a:schemeClr val="dk1"/>
+    </dgm:txFillClrLst>
+    <dgm:txEffectClrLst/>
+  </dgm:styleLbl>
+  <dgm:styleLbl name="fgAccFollowNode1">
+    <dgm:fillClrLst meth="repeat">
+      <a:schemeClr val="accent1">
+        <a:alpha val="90000"/>
+        <a:tint val="40000"/>
+      </a:schemeClr>
+    </dgm:fillClrLst>
+    <dgm:linClrLst meth="repeat">
+      <a:schemeClr val="accent1">
+        <a:alpha val="90000"/>
+        <a:tint val="40000"/>
+      </a:schemeClr>
+    </dgm:linClrLst>
+    <dgm:effectClrLst/>
+    <dgm:txLinClrLst/>
+    <dgm:txFillClrLst meth="repeat">
+      <a:schemeClr val="dk1"/>
+    </dgm:txFillClrLst>
+    <dgm:txEffectClrLst/>
+  </dgm:styleLbl>
+  <dgm:styleLbl name="alignAccFollowNode1">
+    <dgm:fillClrLst meth="repeat">
+      <a:schemeClr val="accent1">
+        <a:alpha val="90000"/>
+        <a:tint val="40000"/>
+      </a:schemeClr>
+    </dgm:fillClrLst>
+    <dgm:linClrLst meth="repeat">
+      <a:schemeClr val="accent1">
+        <a:alpha val="90000"/>
+        <a:tint val="40000"/>
+      </a:schemeClr>
+    </dgm:linClrLst>
+    <dgm:effectClrLst/>
+    <dgm:txLinClrLst/>
+    <dgm:txFillClrLst meth="repeat">
+      <a:schemeClr val="dk1"/>
+    </dgm:txFillClrLst>
+    <dgm:txEffectClrLst/>
+  </dgm:styleLbl>
+  <dgm:styleLbl name="bgAccFollowNode1">
+    <dgm:fillClrLst meth="repeat">
+      <a:schemeClr val="accent1">
+        <a:alpha val="90000"/>
+        <a:tint val="40000"/>
+      </a:schemeClr>
+    </dgm:fillClrLst>
+    <dgm:linClrLst meth="repeat">
+      <a:schemeClr val="accent1">
+        <a:alpha val="90000"/>
+        <a:tint val="40000"/>
+      </a:schemeClr>
+    </dgm:linClrLst>
+    <dgm:effectClrLst/>
+    <dgm:txLinClrLst/>
+    <dgm:txFillClrLst meth="repeat">
+      <a:schemeClr val="dk1"/>
+    </dgm:txFillClrLst>
+    <dgm:txEffectClrLst/>
+  </dgm:styleLbl>
+  <dgm:styleLbl name="fgAcc0">
+    <dgm:fillClrLst meth="repeat">
+      <a:schemeClr val="lt1">
+        <a:alpha val="90000"/>
+      </a:schemeClr>
+    </dgm:fillClrLst>
+    <dgm:linClrLst meth="repeat">
+      <a:schemeClr val="accent1"/>
+    </dgm:linClrLst>
+    <dgm:effectClrLst/>
+    <dgm:txLinClrLst/>
+    <dgm:txFillClrLst meth="repeat">
+      <a:schemeClr val="dk1"/>
+    </dgm:txFillClrLst>
+    <dgm:txEffectClrLst/>
+  </dgm:styleLbl>
+  <dgm:styleLbl name="fgAcc2">
+    <dgm:fillClrLst meth="repeat">
+      <a:schemeClr val="lt1">
+        <a:alpha val="90000"/>
+      </a:schemeClr>
+    </dgm:fillClrLst>
+    <dgm:linClrLst meth="repeat">
+      <a:schemeClr val="accent1"/>
+    </dgm:linClrLst>
+    <dgm:effectClrLst/>
+    <dgm:txLinClrLst/>
+    <dgm:txFillClrLst meth="repeat">
+      <a:schemeClr val="dk1"/>
+    </dgm:txFillClrLst>
+    <dgm:txEffectClrLst/>
+  </dgm:styleLbl>
+  <dgm:styleLbl name="fgAcc3">
+    <dgm:fillClrLst meth="repeat">
+      <a:schemeClr val="lt1">
+        <a:alpha val="90000"/>
+      </a:schemeClr>
+    </dgm:fillClrLst>
+    <dgm:linClrLst meth="repeat">
+      <a:schemeClr val="accent1"/>
+    </dgm:linClrLst>
+    <dgm:effectClrLst/>
+    <dgm:txLinClrLst/>
+    <dgm:txFillClrLst meth="repeat">
+      <a:schemeClr val="dk1"/>
+    </dgm:txFillClrLst>
+    <dgm:txEffectClrLst/>
+  </dgm:styleLbl>
+  <dgm:styleLbl name="fgAcc4">
+    <dgm:fillClrLst meth="repeat">
+      <a:schemeClr val="lt1">
+        <a:alpha val="90000"/>
+      </a:schemeClr>
+    </dgm:fillClrLst>
+    <dgm:linClrLst meth="repeat">
+      <a:schemeClr val="accent1"/>
+    </dgm:linClrLst>
+    <dgm:effectClrLst/>
+    <dgm:txLinClrLst/>
+    <dgm:txFillClrLst meth="repeat">
+      <a:schemeClr val="dk1"/>
+    </dgm:txFillClrLst>
+    <dgm:txEffectClrLst/>
+  </dgm:styleLbl>
+  <dgm:styleLbl name="bgShp">
+    <dgm:fillClrLst meth="repeat">
+      <a:schemeClr val="accent1">
+        <a:tint val="40000"/>
+      </a:schemeClr>
+    </dgm:fillClrLst>
+    <dgm:linClrLst meth="repeat">
+      <a:schemeClr val="accent1"/>
+    </dgm:linClrLst>
+    <dgm:effectClrLst/>
+    <dgm:txLinClrLst/>
+    <dgm:txFillClrLst meth="repeat">
+      <a:schemeClr val="dk1"/>
+    </dgm:txFillClrLst>
+    <dgm:txEffectClrLst/>
+  </dgm:styleLbl>
+  <dgm:styleLbl name="dkBgShp">
+    <dgm:fillClrLst meth="repeat">
+      <a:schemeClr val="accent1">
+        <a:shade val="80000"/>
+      </a:schemeClr>
+    </dgm:fillClrLst>
+    <dgm:linClrLst meth="repeat">
+      <a:schemeClr val="accent1"/>
+    </dgm:linClrLst>
+    <dgm:effectClrLst/>
+    <dgm:txLinClrLst/>
+    <dgm:txFillClrLst meth="repeat">
+      <a:schemeClr val="lt1"/>
+    </dgm:txFillClrLst>
+    <dgm:txEffectClrLst/>
+  </dgm:styleLbl>
+  <dgm:styleLbl name="trBgShp">
+    <dgm:fillClrLst meth="repeat">
+      <a:schemeClr val="accent1">
+        <a:tint val="50000"/>
+        <a:alpha val="40000"/>
+      </a:schemeClr>
+    </dgm:fillClrLst>
+    <dgm:linClrLst meth="repeat">
+      <a:schemeClr val="accent1"/>
+    </dgm:linClrLst>
+    <dgm:effectClrLst/>
+    <dgm:txLinClrLst/>
+    <dgm:txFillClrLst meth="repeat">
+      <a:schemeClr val="lt1"/>
+    </dgm:txFillClrLst>
+    <dgm:txEffectClrLst/>
+  </dgm:styleLbl>
+  <dgm:styleLbl name="fgShp">
+    <dgm:fillClrLst meth="repeat">
+      <a:schemeClr val="accent1">
+        <a:tint val="60000"/>
+      </a:schemeClr>
+    </dgm:fillClrLst>
+    <dgm:linClrLst meth="repeat">
+      <a:schemeClr val="lt1"/>
+    </dgm:linClrLst>
+    <dgm:effectClrLst/>
+    <dgm:txLinClrLst/>
+    <dgm:txFillClrLst meth="repeat">
+      <a:schemeClr val="dk1"/>
+    </dgm:txFillClrLst>
+    <dgm:txEffectClrLst/>
+  </dgm:styleLbl>
+  <dgm:styleLbl name="revTx">
+    <dgm:fillClrLst meth="repeat">
+      <a:schemeClr val="lt1">
+        <a:alpha val="0"/>
+      </a:schemeClr>
+    </dgm:fillClrLst>
+    <dgm:linClrLst meth="repeat">
+      <a:schemeClr val="dk1">
+        <a:alpha val="0"/>
+      </a:schemeClr>
+    </dgm:linClrLst>
+    <dgm:effectClrLst/>
+    <dgm:txLinClrLst/>
+    <dgm:txFillClrLst meth="repeat">
+      <a:schemeClr val="tx1"/>
+    </dgm:txFillClrLst>
+    <dgm:txEffectClrLst/>
+  </dgm:styleLbl>
+</dgm:colorsDef>
+</file>
+
+<file path=ppt/diagrams/data1.xml><?xml version="1.0" encoding="utf-8"?>
+<dgm:dataModel xmlns:dgm="http://schemas.openxmlformats.org/drawingml/2006/diagram" xmlns:a="http://schemas.openxmlformats.org/drawingml/2006/main">
+  <dgm:ptLst>
+    <dgm:pt modelId="{1FD1313F-DA1D-4543-879E-D99B6B99E9B7}" type="doc">
+      <dgm:prSet loTypeId="urn:microsoft.com/office/officeart/2009/3/layout/OpposingIdeas" loCatId="relationship" qsTypeId="urn:microsoft.com/office/officeart/2005/8/quickstyle/simple1" qsCatId="simple" csTypeId="urn:microsoft.com/office/officeart/2005/8/colors/accent1_2" csCatId="accent1" phldr="1"/>
+      <dgm:spPr/>
+      <dgm:t>
+        <a:bodyPr/>
+        <a:lstStyle/>
+        <a:p>
+          <a:endParaRPr lang="es-MX"/>
+        </a:p>
+      </dgm:t>
+    </dgm:pt>
+    <dgm:pt modelId="{B83A57D3-5404-4905-9581-3ED1EB32EDDD}">
+      <dgm:prSet phldrT="[Texto]"/>
+      <dgm:spPr/>
+      <dgm:t>
+        <a:bodyPr/>
+        <a:lstStyle/>
+        <a:p>
+          <a:r>
+            <a:rPr lang="es-ES" dirty="0"/>
+            <a:t>Pros</a:t>
+          </a:r>
+          <a:endParaRPr lang="es-MX" dirty="0"/>
+        </a:p>
+      </dgm:t>
+    </dgm:pt>
+    <dgm:pt modelId="{AC2C57AF-563A-40D7-97BB-464175978D8C}" type="parTrans" cxnId="{E54D75D3-CC6D-425F-8226-FCAB6B3D212B}">
+      <dgm:prSet/>
+      <dgm:spPr/>
+      <dgm:t>
+        <a:bodyPr/>
+        <a:lstStyle/>
+        <a:p>
+          <a:endParaRPr lang="es-MX"/>
+        </a:p>
+      </dgm:t>
+    </dgm:pt>
+    <dgm:pt modelId="{7ACE78A4-57D0-48AB-A817-49B5D98C8330}" type="sibTrans" cxnId="{E54D75D3-CC6D-425F-8226-FCAB6B3D212B}">
+      <dgm:prSet/>
+      <dgm:spPr/>
+      <dgm:t>
+        <a:bodyPr/>
+        <a:lstStyle/>
+        <a:p>
+          <a:endParaRPr lang="es-MX"/>
+        </a:p>
+      </dgm:t>
+    </dgm:pt>
+    <dgm:pt modelId="{14A2B294-FA0D-46D2-A785-D91833582C24}">
+      <dgm:prSet phldrT="[Texto]"/>
+      <dgm:spPr/>
+      <dgm:t>
+        <a:bodyPr/>
+        <a:lstStyle/>
+        <a:p>
+          <a:pPr algn="just"/>
+          <a:r>
+            <a:rPr lang="es-ES" dirty="0"/>
+            <a:t>La arquitectura en nube permite escalar los servicios rápidamente, tener mayor seguridad y usar la confiabilidad de una gran infraestructura</a:t>
+          </a:r>
+          <a:endParaRPr lang="es-MX" dirty="0"/>
+        </a:p>
+      </dgm:t>
+    </dgm:pt>
+    <dgm:pt modelId="{DCF1E420-05EB-4B19-BA10-90AFB334BC09}" type="parTrans" cxnId="{8E6AC8EF-959D-4BA4-AA9E-6F0C5BDDEE2A}">
+      <dgm:prSet/>
+      <dgm:spPr/>
+      <dgm:t>
+        <a:bodyPr/>
+        <a:lstStyle/>
+        <a:p>
+          <a:endParaRPr lang="es-MX"/>
+        </a:p>
+      </dgm:t>
+    </dgm:pt>
+    <dgm:pt modelId="{B8A89164-76BF-49DB-93CD-6B09B64D32F6}" type="sibTrans" cxnId="{8E6AC8EF-959D-4BA4-AA9E-6F0C5BDDEE2A}">
+      <dgm:prSet/>
+      <dgm:spPr/>
+      <dgm:t>
+        <a:bodyPr/>
+        <a:lstStyle/>
+        <a:p>
+          <a:endParaRPr lang="es-MX"/>
+        </a:p>
+      </dgm:t>
+    </dgm:pt>
+    <dgm:pt modelId="{4B60E399-D53C-446E-A259-FD966C369DB9}">
+      <dgm:prSet phldrT="[Texto]"/>
+      <dgm:spPr/>
+      <dgm:t>
+        <a:bodyPr/>
+        <a:lstStyle/>
+        <a:p>
+          <a:r>
+            <a:rPr lang="es-ES" dirty="0"/>
+            <a:t>Contras</a:t>
+          </a:r>
+          <a:endParaRPr lang="es-MX" dirty="0"/>
+        </a:p>
+      </dgm:t>
+    </dgm:pt>
+    <dgm:pt modelId="{700DA97B-9A46-44B4-9FE3-85A419AA53F0}" type="parTrans" cxnId="{34BAEF67-E0D4-4FD6-AB5B-A069E7D55CE4}">
+      <dgm:prSet/>
+      <dgm:spPr/>
+      <dgm:t>
+        <a:bodyPr/>
+        <a:lstStyle/>
+        <a:p>
+          <a:endParaRPr lang="es-MX"/>
+        </a:p>
+      </dgm:t>
+    </dgm:pt>
+    <dgm:pt modelId="{66D7ECDB-455E-4A74-B480-33C132110CD5}" type="sibTrans" cxnId="{34BAEF67-E0D4-4FD6-AB5B-A069E7D55CE4}">
+      <dgm:prSet/>
+      <dgm:spPr/>
+      <dgm:t>
+        <a:bodyPr/>
+        <a:lstStyle/>
+        <a:p>
+          <a:endParaRPr lang="es-MX"/>
+        </a:p>
+      </dgm:t>
+    </dgm:pt>
+    <dgm:pt modelId="{93CF5924-4D1F-44BA-83CC-A822A5FFB801}">
+      <dgm:prSet phldrT="[Texto]"/>
+      <dgm:spPr/>
+      <dgm:t>
+        <a:bodyPr/>
+        <a:lstStyle/>
+        <a:p>
+          <a:pPr algn="just"/>
+          <a:r>
+            <a:rPr lang="es-ES" dirty="0"/>
+            <a:t>Costos asociados al uso de los servicios que según su demanda pueden limitar la implementación de una solución.</a:t>
+          </a:r>
+          <a:endParaRPr lang="es-MX" dirty="0"/>
+        </a:p>
+      </dgm:t>
+    </dgm:pt>
+    <dgm:pt modelId="{41E7C83D-BC43-4835-ACAC-CD98024BE0BF}" type="parTrans" cxnId="{BB609223-8C80-4979-B188-F11A53D5EC7D}">
+      <dgm:prSet/>
+      <dgm:spPr/>
+      <dgm:t>
+        <a:bodyPr/>
+        <a:lstStyle/>
+        <a:p>
+          <a:endParaRPr lang="es-MX"/>
+        </a:p>
+      </dgm:t>
+    </dgm:pt>
+    <dgm:pt modelId="{887F2D00-DA0B-463A-A3DF-2ED735F740A1}" type="sibTrans" cxnId="{BB609223-8C80-4979-B188-F11A53D5EC7D}">
+      <dgm:prSet/>
+      <dgm:spPr/>
+      <dgm:t>
+        <a:bodyPr/>
+        <a:lstStyle/>
+        <a:p>
+          <a:endParaRPr lang="es-MX"/>
+        </a:p>
+      </dgm:t>
+    </dgm:pt>
+    <dgm:pt modelId="{3B1B5F30-0E40-4E03-9F86-CD41AB45A3EB}">
+      <dgm:prSet phldrT="[Texto]"/>
+      <dgm:spPr/>
+      <dgm:t>
+        <a:bodyPr/>
+        <a:lstStyle/>
+        <a:p>
+          <a:pPr algn="just"/>
+          <a:r>
+            <a:rPr lang="es-ES" dirty="0"/>
+            <a:t>La arquitectura anteriormente vista se puede implementar en otra nube como </a:t>
+          </a:r>
+          <a:r>
+            <a:rPr lang="es-ES" dirty="0" err="1"/>
+            <a:t>GCP</a:t>
+          </a:r>
+          <a:r>
+            <a:rPr lang="es-ES" dirty="0"/>
+            <a:t>.</a:t>
+          </a:r>
+        </a:p>
+        <a:p>
+          <a:pPr algn="just"/>
+          <a:r>
+            <a:rPr lang="es-ES" dirty="0"/>
+            <a:t>Todo el desarrollo tendrá </a:t>
+          </a:r>
+          <a:r>
+            <a:rPr lang="es-ES" dirty="0" err="1"/>
+            <a:t>versionamiento</a:t>
+          </a:r>
+          <a:r>
+            <a:rPr lang="es-ES" dirty="0"/>
+            <a:t> de código, test y despliegue a producción lo más controlado posible. </a:t>
+          </a:r>
+        </a:p>
+        <a:p>
+          <a:pPr algn="l"/>
+          <a:endParaRPr lang="es-MX" dirty="0"/>
+        </a:p>
+      </dgm:t>
+    </dgm:pt>
+    <dgm:pt modelId="{B44E5F66-6F88-4864-AB9D-169302B6448A}" type="parTrans" cxnId="{679D65BB-89D7-4DB8-BF72-87664D469FAF}">
+      <dgm:prSet/>
+      <dgm:spPr/>
+      <dgm:t>
+        <a:bodyPr/>
+        <a:lstStyle/>
+        <a:p>
+          <a:endParaRPr lang="es-MX"/>
+        </a:p>
+      </dgm:t>
+    </dgm:pt>
+    <dgm:pt modelId="{54F5DB86-0025-4CDE-99C2-E127F8809624}" type="sibTrans" cxnId="{679D65BB-89D7-4DB8-BF72-87664D469FAF}">
+      <dgm:prSet/>
+      <dgm:spPr/>
+      <dgm:t>
+        <a:bodyPr/>
+        <a:lstStyle/>
+        <a:p>
+          <a:endParaRPr lang="es-MX"/>
+        </a:p>
+      </dgm:t>
+    </dgm:pt>
+    <dgm:pt modelId="{373B3946-0C26-412B-ABB5-C260AEFB30D6}">
+      <dgm:prSet phldrT="[Texto]"/>
+      <dgm:spPr/>
+      <dgm:t>
+        <a:bodyPr/>
+        <a:lstStyle/>
+        <a:p>
+          <a:pPr algn="just"/>
+          <a:r>
+            <a:rPr lang="es-ES" dirty="0"/>
+            <a:t>No es claro cuál servicio tiene contratado la compañía hoy en día, por lo que la propuesta puede cambiar de servicios.</a:t>
+          </a:r>
+        </a:p>
+        <a:p>
+          <a:pPr algn="just"/>
+          <a:r>
+            <a:rPr lang="es-MX" dirty="0"/>
+            <a:t>Sería irresponsable adjuntar una codificación con una posible solución tangible, puesto que no se tienen los requerimientos funcionales y no funcionales ya definidos.</a:t>
+          </a:r>
+        </a:p>
+      </dgm:t>
+    </dgm:pt>
+    <dgm:pt modelId="{73C878AC-C3FE-4E3E-B8D1-5683FC5D1E8A}" type="parTrans" cxnId="{0F85C8ED-4CF4-4208-9D39-5EDB1AD6DD08}">
+      <dgm:prSet/>
+      <dgm:spPr/>
+      <dgm:t>
+        <a:bodyPr/>
+        <a:lstStyle/>
+        <a:p>
+          <a:endParaRPr lang="es-MX"/>
+        </a:p>
+      </dgm:t>
+    </dgm:pt>
+    <dgm:pt modelId="{66EFE508-F44D-49E2-894B-BE5E9F919007}" type="sibTrans" cxnId="{0F85C8ED-4CF4-4208-9D39-5EDB1AD6DD08}">
+      <dgm:prSet/>
+      <dgm:spPr/>
+      <dgm:t>
+        <a:bodyPr/>
+        <a:lstStyle/>
+        <a:p>
+          <a:endParaRPr lang="es-MX"/>
+        </a:p>
+      </dgm:t>
+    </dgm:pt>
+    <dgm:pt modelId="{0ACED885-A24C-4137-891E-0A67491800A6}" type="pres">
+      <dgm:prSet presAssocID="{1FD1313F-DA1D-4543-879E-D99B6B99E9B7}" presName="Name0" presStyleCnt="0">
+        <dgm:presLayoutVars>
+          <dgm:chMax val="2"/>
+          <dgm:dir/>
+          <dgm:animOne val="branch"/>
+          <dgm:animLvl val="lvl"/>
+          <dgm:resizeHandles val="exact"/>
+        </dgm:presLayoutVars>
+      </dgm:prSet>
+      <dgm:spPr/>
+    </dgm:pt>
+    <dgm:pt modelId="{D654171B-7880-4366-8971-D5A09A49E24B}" type="pres">
+      <dgm:prSet presAssocID="{1FD1313F-DA1D-4543-879E-D99B6B99E9B7}" presName="Background" presStyleLbl="node1" presStyleIdx="0" presStyleCnt="1"/>
+      <dgm:spPr/>
+    </dgm:pt>
+    <dgm:pt modelId="{2F6CAF49-9A70-41EA-82BC-3868050B28FA}" type="pres">
+      <dgm:prSet presAssocID="{1FD1313F-DA1D-4543-879E-D99B6B99E9B7}" presName="Divider" presStyleLbl="callout" presStyleIdx="0" presStyleCnt="1"/>
+      <dgm:spPr/>
+    </dgm:pt>
+    <dgm:pt modelId="{37F44146-AD07-48A1-88E3-3C4BCB7E24CA}" type="pres">
+      <dgm:prSet presAssocID="{1FD1313F-DA1D-4543-879E-D99B6B99E9B7}" presName="ChildText1" presStyleLbl="revTx" presStyleIdx="0" presStyleCnt="0">
+        <dgm:presLayoutVars>
+          <dgm:chMax val="0"/>
+          <dgm:chPref val="0"/>
+          <dgm:bulletEnabled val="1"/>
+        </dgm:presLayoutVars>
+      </dgm:prSet>
+      <dgm:spPr/>
+    </dgm:pt>
+    <dgm:pt modelId="{9E1583FE-96DE-4901-B399-AFEEC8C599DA}" type="pres">
+      <dgm:prSet presAssocID="{1FD1313F-DA1D-4543-879E-D99B6B99E9B7}" presName="ChildText2" presStyleLbl="revTx" presStyleIdx="0" presStyleCnt="0">
+        <dgm:presLayoutVars>
+          <dgm:chMax val="0"/>
+          <dgm:chPref val="0"/>
+          <dgm:bulletEnabled val="1"/>
+        </dgm:presLayoutVars>
+      </dgm:prSet>
+      <dgm:spPr/>
+    </dgm:pt>
+    <dgm:pt modelId="{1328ECE5-41CD-47DB-BA11-65F2A150FE26}" type="pres">
+      <dgm:prSet presAssocID="{1FD1313F-DA1D-4543-879E-D99B6B99E9B7}" presName="ParentText1" presStyleLbl="revTx" presStyleIdx="0" presStyleCnt="0">
+        <dgm:presLayoutVars>
+          <dgm:chMax val="1"/>
+          <dgm:chPref val="1"/>
+        </dgm:presLayoutVars>
+      </dgm:prSet>
+      <dgm:spPr/>
+    </dgm:pt>
+    <dgm:pt modelId="{DF4D5F54-F522-49E1-A722-411361FEEF39}" type="pres">
+      <dgm:prSet presAssocID="{1FD1313F-DA1D-4543-879E-D99B6B99E9B7}" presName="ParentShape1" presStyleLbl="alignImgPlace1" presStyleIdx="0" presStyleCnt="2">
+        <dgm:presLayoutVars/>
+      </dgm:prSet>
+      <dgm:spPr/>
+    </dgm:pt>
+    <dgm:pt modelId="{29E6CA93-8068-419C-B2CF-0AACC5C154C9}" type="pres">
+      <dgm:prSet presAssocID="{1FD1313F-DA1D-4543-879E-D99B6B99E9B7}" presName="ParentText2" presStyleLbl="revTx" presStyleIdx="0" presStyleCnt="0">
+        <dgm:presLayoutVars>
+          <dgm:chMax val="1"/>
+          <dgm:chPref val="1"/>
+        </dgm:presLayoutVars>
+      </dgm:prSet>
+      <dgm:spPr/>
+    </dgm:pt>
+    <dgm:pt modelId="{5980CF19-CC8E-4B7B-88BC-E2AAE3F05A8C}" type="pres">
+      <dgm:prSet presAssocID="{1FD1313F-DA1D-4543-879E-D99B6B99E9B7}" presName="ParentShape2" presStyleLbl="alignImgPlace1" presStyleIdx="1" presStyleCnt="2">
+        <dgm:presLayoutVars/>
+      </dgm:prSet>
+      <dgm:spPr/>
+    </dgm:pt>
+  </dgm:ptLst>
+  <dgm:cxnLst>
+    <dgm:cxn modelId="{3C38DE19-AD56-45AC-AB20-5BE49BF9EE32}" type="presOf" srcId="{1FD1313F-DA1D-4543-879E-D99B6B99E9B7}" destId="{0ACED885-A24C-4137-891E-0A67491800A6}" srcOrd="0" destOrd="0" presId="urn:microsoft.com/office/officeart/2009/3/layout/OpposingIdeas"/>
+    <dgm:cxn modelId="{BB609223-8C80-4979-B188-F11A53D5EC7D}" srcId="{4B60E399-D53C-446E-A259-FD966C369DB9}" destId="{93CF5924-4D1F-44BA-83CC-A822A5FFB801}" srcOrd="0" destOrd="0" parTransId="{41E7C83D-BC43-4835-ACAC-CD98024BE0BF}" sibTransId="{887F2D00-DA0B-463A-A3DF-2ED735F740A1}"/>
+    <dgm:cxn modelId="{91C5C92E-463E-43EB-9807-6916C1B0AA6D}" type="presOf" srcId="{B83A57D3-5404-4905-9581-3ED1EB32EDDD}" destId="{DF4D5F54-F522-49E1-A722-411361FEEF39}" srcOrd="1" destOrd="0" presId="urn:microsoft.com/office/officeart/2009/3/layout/OpposingIdeas"/>
+    <dgm:cxn modelId="{4C5BE536-C69B-4997-A78F-7816502E7B2C}" type="presOf" srcId="{14A2B294-FA0D-46D2-A785-D91833582C24}" destId="{37F44146-AD07-48A1-88E3-3C4BCB7E24CA}" srcOrd="0" destOrd="0" presId="urn:microsoft.com/office/officeart/2009/3/layout/OpposingIdeas"/>
+    <dgm:cxn modelId="{34BAEF67-E0D4-4FD6-AB5B-A069E7D55CE4}" srcId="{1FD1313F-DA1D-4543-879E-D99B6B99E9B7}" destId="{4B60E399-D53C-446E-A259-FD966C369DB9}" srcOrd="1" destOrd="0" parTransId="{700DA97B-9A46-44B4-9FE3-85A419AA53F0}" sibTransId="{66D7ECDB-455E-4A74-B480-33C132110CD5}"/>
+    <dgm:cxn modelId="{B0C48C6E-8C48-4076-814F-E735D9707597}" type="presOf" srcId="{4B60E399-D53C-446E-A259-FD966C369DB9}" destId="{29E6CA93-8068-419C-B2CF-0AACC5C154C9}" srcOrd="0" destOrd="0" presId="urn:microsoft.com/office/officeart/2009/3/layout/OpposingIdeas"/>
+    <dgm:cxn modelId="{EC616A55-3AAE-4353-B53F-B02B1DEC9D40}" type="presOf" srcId="{3B1B5F30-0E40-4E03-9F86-CD41AB45A3EB}" destId="{37F44146-AD07-48A1-88E3-3C4BCB7E24CA}" srcOrd="0" destOrd="1" presId="urn:microsoft.com/office/officeart/2009/3/layout/OpposingIdeas"/>
+    <dgm:cxn modelId="{1A512B78-4A28-4F3D-8DB8-87557C7ED4F0}" type="presOf" srcId="{93CF5924-4D1F-44BA-83CC-A822A5FFB801}" destId="{9E1583FE-96DE-4901-B399-AFEEC8C599DA}" srcOrd="0" destOrd="0" presId="urn:microsoft.com/office/officeart/2009/3/layout/OpposingIdeas"/>
+    <dgm:cxn modelId="{C0C8929C-5383-483E-8909-80EB7520674E}" type="presOf" srcId="{B83A57D3-5404-4905-9581-3ED1EB32EDDD}" destId="{1328ECE5-41CD-47DB-BA11-65F2A150FE26}" srcOrd="0" destOrd="0" presId="urn:microsoft.com/office/officeart/2009/3/layout/OpposingIdeas"/>
+    <dgm:cxn modelId="{93912DA0-5EF0-4E89-BE25-B8D25585FD13}" type="presOf" srcId="{4B60E399-D53C-446E-A259-FD966C369DB9}" destId="{5980CF19-CC8E-4B7B-88BC-E2AAE3F05A8C}" srcOrd="1" destOrd="0" presId="urn:microsoft.com/office/officeart/2009/3/layout/OpposingIdeas"/>
+    <dgm:cxn modelId="{0E247EAB-D30E-4446-B188-2529F82E2D95}" type="presOf" srcId="{373B3946-0C26-412B-ABB5-C260AEFB30D6}" destId="{9E1583FE-96DE-4901-B399-AFEEC8C599DA}" srcOrd="0" destOrd="1" presId="urn:microsoft.com/office/officeart/2009/3/layout/OpposingIdeas"/>
+    <dgm:cxn modelId="{679D65BB-89D7-4DB8-BF72-87664D469FAF}" srcId="{B83A57D3-5404-4905-9581-3ED1EB32EDDD}" destId="{3B1B5F30-0E40-4E03-9F86-CD41AB45A3EB}" srcOrd="1" destOrd="0" parTransId="{B44E5F66-6F88-4864-AB9D-169302B6448A}" sibTransId="{54F5DB86-0025-4CDE-99C2-E127F8809624}"/>
+    <dgm:cxn modelId="{E54D75D3-CC6D-425F-8226-FCAB6B3D212B}" srcId="{1FD1313F-DA1D-4543-879E-D99B6B99E9B7}" destId="{B83A57D3-5404-4905-9581-3ED1EB32EDDD}" srcOrd="0" destOrd="0" parTransId="{AC2C57AF-563A-40D7-97BB-464175978D8C}" sibTransId="{7ACE78A4-57D0-48AB-A817-49B5D98C8330}"/>
+    <dgm:cxn modelId="{0F85C8ED-4CF4-4208-9D39-5EDB1AD6DD08}" srcId="{4B60E399-D53C-446E-A259-FD966C369DB9}" destId="{373B3946-0C26-412B-ABB5-C260AEFB30D6}" srcOrd="1" destOrd="0" parTransId="{73C878AC-C3FE-4E3E-B8D1-5683FC5D1E8A}" sibTransId="{66EFE508-F44D-49E2-894B-BE5E9F919007}"/>
+    <dgm:cxn modelId="{8E6AC8EF-959D-4BA4-AA9E-6F0C5BDDEE2A}" srcId="{B83A57D3-5404-4905-9581-3ED1EB32EDDD}" destId="{14A2B294-FA0D-46D2-A785-D91833582C24}" srcOrd="0" destOrd="0" parTransId="{DCF1E420-05EB-4B19-BA10-90AFB334BC09}" sibTransId="{B8A89164-76BF-49DB-93CD-6B09B64D32F6}"/>
+    <dgm:cxn modelId="{5680F9BF-2703-48B0-B2F4-CC0BF0DF2DDB}" type="presParOf" srcId="{0ACED885-A24C-4137-891E-0A67491800A6}" destId="{D654171B-7880-4366-8971-D5A09A49E24B}" srcOrd="0" destOrd="0" presId="urn:microsoft.com/office/officeart/2009/3/layout/OpposingIdeas"/>
+    <dgm:cxn modelId="{A55B448C-8E18-49F4-A39A-0CA642CEA1E3}" type="presParOf" srcId="{0ACED885-A24C-4137-891E-0A67491800A6}" destId="{2F6CAF49-9A70-41EA-82BC-3868050B28FA}" srcOrd="1" destOrd="0" presId="urn:microsoft.com/office/officeart/2009/3/layout/OpposingIdeas"/>
+    <dgm:cxn modelId="{2958DF09-8CC2-457A-A189-0ED2B2B25A7D}" type="presParOf" srcId="{0ACED885-A24C-4137-891E-0A67491800A6}" destId="{37F44146-AD07-48A1-88E3-3C4BCB7E24CA}" srcOrd="2" destOrd="0" presId="urn:microsoft.com/office/officeart/2009/3/layout/OpposingIdeas"/>
+    <dgm:cxn modelId="{CC146A01-2C8E-463C-89D3-5C6E25578FA6}" type="presParOf" srcId="{0ACED885-A24C-4137-891E-0A67491800A6}" destId="{9E1583FE-96DE-4901-B399-AFEEC8C599DA}" srcOrd="3" destOrd="0" presId="urn:microsoft.com/office/officeart/2009/3/layout/OpposingIdeas"/>
+    <dgm:cxn modelId="{4D246755-846E-476B-8CFC-FECF4B23D637}" type="presParOf" srcId="{0ACED885-A24C-4137-891E-0A67491800A6}" destId="{1328ECE5-41CD-47DB-BA11-65F2A150FE26}" srcOrd="4" destOrd="0" presId="urn:microsoft.com/office/officeart/2009/3/layout/OpposingIdeas"/>
+    <dgm:cxn modelId="{0F2D1804-D19A-45D5-A76D-83AF17E652C6}" type="presParOf" srcId="{0ACED885-A24C-4137-891E-0A67491800A6}" destId="{DF4D5F54-F522-49E1-A722-411361FEEF39}" srcOrd="5" destOrd="0" presId="urn:microsoft.com/office/officeart/2009/3/layout/OpposingIdeas"/>
+    <dgm:cxn modelId="{14035601-5C05-4228-B684-B7AAF28B2C71}" type="presParOf" srcId="{0ACED885-A24C-4137-891E-0A67491800A6}" destId="{29E6CA93-8068-419C-B2CF-0AACC5C154C9}" srcOrd="6" destOrd="0" presId="urn:microsoft.com/office/officeart/2009/3/layout/OpposingIdeas"/>
+    <dgm:cxn modelId="{50385720-F00D-4180-8F17-EE3E07041EF0}" type="presParOf" srcId="{0ACED885-A24C-4137-891E-0A67491800A6}" destId="{5980CF19-CC8E-4B7B-88BC-E2AAE3F05A8C}" srcOrd="7" destOrd="0" presId="urn:microsoft.com/office/officeart/2009/3/layout/OpposingIdeas"/>
+  </dgm:cxnLst>
+  <dgm:bg/>
+  <dgm:whole/>
+  <dgm:extLst>
+    <a:ext uri="http://schemas.microsoft.com/office/drawing/2008/diagram">
+      <dsp:dataModelExt xmlns:dsp="http://schemas.microsoft.com/office/drawing/2008/diagram" relId="rId6" minVer="http://schemas.openxmlformats.org/drawingml/2006/diagram"/>
+    </a:ext>
+  </dgm:extLst>
+</dgm:dataModel>
+</file>
+
+<file path=ppt/diagrams/drawing1.xml><?xml version="1.0" encoding="utf-8"?>
+<dsp:drawing xmlns:dgm="http://schemas.openxmlformats.org/drawingml/2006/diagram" xmlns:dsp="http://schemas.microsoft.com/office/drawing/2008/diagram" xmlns:a="http://schemas.openxmlformats.org/drawingml/2006/main">
+  <dsp:spTree>
+    <dsp:nvGrpSpPr>
+      <dsp:cNvPr id="0" name=""/>
+      <dsp:cNvGrpSpPr/>
+    </dsp:nvGrpSpPr>
+    <dsp:grpSpPr/>
+    <dsp:sp modelId="{D654171B-7880-4366-8971-D5A09A49E24B}">
+      <dsp:nvSpPr>
+        <dsp:cNvPr id="0" name=""/>
+        <dsp:cNvSpPr/>
+      </dsp:nvSpPr>
+      <dsp:spPr>
+        <a:xfrm>
+          <a:off x="1429320" y="921173"/>
+          <a:ext cx="6650330" cy="3576320"/>
+        </a:xfrm>
+        <a:prstGeom prst="round2DiagRect">
+          <a:avLst>
+            <a:gd name="adj1" fmla="val 0"/>
+            <a:gd name="adj2" fmla="val 16670"/>
+          </a:avLst>
+        </a:prstGeom>
+        <a:solidFill>
+          <a:schemeClr val="accent1">
+            <a:hueOff val="0"/>
+            <a:satOff val="0"/>
+            <a:lumOff val="0"/>
+            <a:alphaOff val="0"/>
+          </a:schemeClr>
+        </a:solidFill>
+        <a:ln w="15875" cap="flat" cmpd="sng" algn="ctr">
+          <a:solidFill>
+            <a:schemeClr val="lt1">
+              <a:hueOff val="0"/>
+              <a:satOff val="0"/>
+              <a:lumOff val="0"/>
+              <a:alphaOff val="0"/>
+            </a:schemeClr>
+          </a:solidFill>
+          <a:prstDash val="solid"/>
+        </a:ln>
+        <a:effectLst/>
+      </dsp:spPr>
+      <dsp:style>
+        <a:lnRef idx="2">
+          <a:scrgbClr r="0" g="0" b="0"/>
+        </a:lnRef>
+        <a:fillRef idx="1">
+          <a:scrgbClr r="0" g="0" b="0"/>
+        </a:fillRef>
+        <a:effectRef idx="0">
+          <a:scrgbClr r="0" g="0" b="0"/>
+        </a:effectRef>
+        <a:fontRef idx="minor">
+          <a:schemeClr val="lt1"/>
+        </a:fontRef>
+      </dsp:style>
+    </dsp:sp>
+    <dsp:sp modelId="{2F6CAF49-9A70-41EA-82BC-3868050B28FA}">
+      <dsp:nvSpPr>
+        <dsp:cNvPr id="0" name=""/>
+        <dsp:cNvSpPr/>
+      </dsp:nvSpPr>
+      <dsp:spPr>
+        <a:xfrm>
+          <a:off x="4754485" y="1300480"/>
+          <a:ext cx="886" cy="2817706"/>
+        </a:xfrm>
+        <a:prstGeom prst="line">
+          <a:avLst/>
+        </a:prstGeom>
+        <a:solidFill>
+          <a:schemeClr val="accent1">
+            <a:hueOff val="0"/>
+            <a:satOff val="0"/>
+            <a:lumOff val="0"/>
+            <a:alphaOff val="0"/>
+          </a:schemeClr>
+        </a:solidFill>
+        <a:ln w="15875" cap="flat" cmpd="sng" algn="ctr">
+          <a:solidFill>
+            <a:schemeClr val="accent1">
+              <a:tint val="50000"/>
+              <a:hueOff val="0"/>
+              <a:satOff val="0"/>
+              <a:lumOff val="0"/>
+              <a:alphaOff val="0"/>
+            </a:schemeClr>
+          </a:solidFill>
+          <a:prstDash val="solid"/>
+        </a:ln>
+        <a:effectLst/>
+      </dsp:spPr>
+      <dsp:style>
+        <a:lnRef idx="2">
+          <a:scrgbClr r="0" g="0" b="0"/>
+        </a:lnRef>
+        <a:fillRef idx="1">
+          <a:scrgbClr r="0" g="0" b="0"/>
+        </a:fillRef>
+        <a:effectRef idx="0">
+          <a:scrgbClr r="0" g="0" b="0"/>
+        </a:effectRef>
+        <a:fontRef idx="minor"/>
+      </dsp:style>
+    </dsp:sp>
+    <dsp:sp modelId="{37F44146-AD07-48A1-88E3-3C4BCB7E24CA}">
+      <dsp:nvSpPr>
+        <dsp:cNvPr id="0" name=""/>
+        <dsp:cNvSpPr/>
+      </dsp:nvSpPr>
+      <dsp:spPr>
+        <a:xfrm>
+          <a:off x="1650998" y="1192106"/>
+          <a:ext cx="2881809" cy="3034453"/>
+        </a:xfrm>
+        <a:prstGeom prst="rect">
+          <a:avLst/>
+        </a:prstGeom>
+        <a:noFill/>
+        <a:ln>
+          <a:noFill/>
+        </a:ln>
+        <a:effectLst/>
+        <a:sp3d/>
+      </dsp:spPr>
+      <dsp:style>
+        <a:lnRef idx="0">
+          <a:scrgbClr r="0" g="0" b="0"/>
+        </a:lnRef>
+        <a:fillRef idx="0">
+          <a:scrgbClr r="0" g="0" b="0"/>
+        </a:fillRef>
+        <a:effectRef idx="0">
+          <a:scrgbClr r="0" g="0" b="0"/>
+        </a:effectRef>
+        <a:fontRef idx="minor"/>
+      </dsp:style>
+      <dsp:txBody>
+        <a:bodyPr spcFirstLastPara="0" vert="horz" wrap="square" lIns="53340" tIns="53340" rIns="53340" bIns="53340" numCol="1" spcCol="1270" anchor="t" anchorCtr="0">
+          <a:noAutofit/>
+        </a:bodyPr>
+        <a:lstStyle/>
+        <a:p>
+          <a:pPr marL="0" lvl="0" indent="0" algn="just" defTabSz="622300">
+            <a:lnSpc>
+              <a:spcPct val="90000"/>
+            </a:lnSpc>
+            <a:spcBef>
+              <a:spcPct val="0"/>
+            </a:spcBef>
+            <a:spcAft>
+              <a:spcPct val="35000"/>
+            </a:spcAft>
+            <a:buNone/>
+          </a:pPr>
+          <a:r>
+            <a:rPr lang="es-ES" sz="1400" kern="1200" dirty="0"/>
+            <a:t>La arquitectura en nube permite escalar los servicios rápidamente, tener mayor seguridad y usar la confiabilidad de una gran infraestructura</a:t>
+          </a:r>
+          <a:endParaRPr lang="es-MX" sz="1400" kern="1200" dirty="0"/>
+        </a:p>
+        <a:p>
+          <a:pPr marL="0" lvl="0" indent="0" algn="just" defTabSz="622300">
+            <a:lnSpc>
+              <a:spcPct val="90000"/>
+            </a:lnSpc>
+            <a:spcBef>
+              <a:spcPct val="0"/>
+            </a:spcBef>
+            <a:spcAft>
+              <a:spcPct val="35000"/>
+            </a:spcAft>
+            <a:buNone/>
+          </a:pPr>
+          <a:r>
+            <a:rPr lang="es-ES" sz="1400" kern="1200" dirty="0"/>
+            <a:t>La arquitectura anteriormente vista se puede implementar en otra nube como </a:t>
+          </a:r>
+          <a:r>
+            <a:rPr lang="es-ES" sz="1400" kern="1200" dirty="0" err="1"/>
+            <a:t>GCP</a:t>
+          </a:r>
+          <a:r>
+            <a:rPr lang="es-ES" sz="1400" kern="1200" dirty="0"/>
+            <a:t>.</a:t>
+          </a:r>
+        </a:p>
+        <a:p>
+          <a:pPr marL="0" lvl="0" indent="0" algn="just" defTabSz="622300">
+            <a:lnSpc>
+              <a:spcPct val="90000"/>
+            </a:lnSpc>
+            <a:spcBef>
+              <a:spcPct val="0"/>
+            </a:spcBef>
+            <a:spcAft>
+              <a:spcPct val="35000"/>
+            </a:spcAft>
+            <a:buNone/>
+          </a:pPr>
+          <a:r>
+            <a:rPr lang="es-ES" sz="1400" kern="1200" dirty="0"/>
+            <a:t>Todo el desarrollo tendrá </a:t>
+          </a:r>
+          <a:r>
+            <a:rPr lang="es-ES" sz="1400" kern="1200" dirty="0" err="1"/>
+            <a:t>versionamiento</a:t>
+          </a:r>
+          <a:r>
+            <a:rPr lang="es-ES" sz="1400" kern="1200" dirty="0"/>
+            <a:t> de código, test y despliegue a producción lo más controlado posible. </a:t>
+          </a:r>
+        </a:p>
+        <a:p>
+          <a:pPr marL="0" lvl="0" indent="0" algn="l" defTabSz="622300">
+            <a:lnSpc>
+              <a:spcPct val="90000"/>
+            </a:lnSpc>
+            <a:spcBef>
+              <a:spcPct val="0"/>
+            </a:spcBef>
+            <a:spcAft>
+              <a:spcPct val="35000"/>
+            </a:spcAft>
+            <a:buNone/>
+          </a:pPr>
+          <a:endParaRPr lang="es-MX" sz="1400" kern="1200" dirty="0"/>
+        </a:p>
+      </dsp:txBody>
+      <dsp:txXfrm>
+        <a:off x="1650998" y="1192106"/>
+        <a:ext cx="2881809" cy="3034453"/>
+      </dsp:txXfrm>
+    </dsp:sp>
+    <dsp:sp modelId="{9E1583FE-96DE-4901-B399-AFEEC8C599DA}">
+      <dsp:nvSpPr>
+        <dsp:cNvPr id="0" name=""/>
+        <dsp:cNvSpPr/>
+      </dsp:nvSpPr>
+      <dsp:spPr>
+        <a:xfrm>
+          <a:off x="4976163" y="1192106"/>
+          <a:ext cx="2881809" cy="3034453"/>
+        </a:xfrm>
+        <a:prstGeom prst="rect">
+          <a:avLst/>
+        </a:prstGeom>
+        <a:noFill/>
+        <a:ln>
+          <a:noFill/>
+        </a:ln>
+        <a:effectLst/>
+        <a:sp3d/>
+      </dsp:spPr>
+      <dsp:style>
+        <a:lnRef idx="0">
+          <a:scrgbClr r="0" g="0" b="0"/>
+        </a:lnRef>
+        <a:fillRef idx="0">
+          <a:scrgbClr r="0" g="0" b="0"/>
+        </a:fillRef>
+        <a:effectRef idx="0">
+          <a:scrgbClr r="0" g="0" b="0"/>
+        </a:effectRef>
+        <a:fontRef idx="minor"/>
+      </dsp:style>
+      <dsp:txBody>
+        <a:bodyPr spcFirstLastPara="0" vert="horz" wrap="square" lIns="53340" tIns="53340" rIns="53340" bIns="53340" numCol="1" spcCol="1270" anchor="t" anchorCtr="0">
+          <a:noAutofit/>
+        </a:bodyPr>
+        <a:lstStyle/>
+        <a:p>
+          <a:pPr marL="0" lvl="0" indent="0" algn="just" defTabSz="622300">
+            <a:lnSpc>
+              <a:spcPct val="90000"/>
+            </a:lnSpc>
+            <a:spcBef>
+              <a:spcPct val="0"/>
+            </a:spcBef>
+            <a:spcAft>
+              <a:spcPct val="35000"/>
+            </a:spcAft>
+            <a:buNone/>
+          </a:pPr>
+          <a:r>
+            <a:rPr lang="es-ES" sz="1400" kern="1200" dirty="0"/>
+            <a:t>Costos asociados al uso de los servicios que según su demanda pueden limitar la implementación de una solución.</a:t>
+          </a:r>
+          <a:endParaRPr lang="es-MX" sz="1400" kern="1200" dirty="0"/>
+        </a:p>
+        <a:p>
+          <a:pPr marL="0" lvl="0" indent="0" algn="just" defTabSz="622300">
+            <a:lnSpc>
+              <a:spcPct val="90000"/>
+            </a:lnSpc>
+            <a:spcBef>
+              <a:spcPct val="0"/>
+            </a:spcBef>
+            <a:spcAft>
+              <a:spcPct val="35000"/>
+            </a:spcAft>
+            <a:buNone/>
+          </a:pPr>
+          <a:r>
+            <a:rPr lang="es-ES" sz="1400" kern="1200" dirty="0"/>
+            <a:t>No es claro cuál servicio tiene contratado la compañía hoy en día, por lo que la propuesta puede cambiar de servicios.</a:t>
+          </a:r>
+        </a:p>
+        <a:p>
+          <a:pPr marL="0" lvl="0" indent="0" algn="just" defTabSz="622300">
+            <a:lnSpc>
+              <a:spcPct val="90000"/>
+            </a:lnSpc>
+            <a:spcBef>
+              <a:spcPct val="0"/>
+            </a:spcBef>
+            <a:spcAft>
+              <a:spcPct val="35000"/>
+            </a:spcAft>
+            <a:buNone/>
+          </a:pPr>
+          <a:r>
+            <a:rPr lang="es-MX" sz="1400" kern="1200" dirty="0"/>
+            <a:t>Sería irresponsable adjuntar una codificación con una posible solución tangible, puesto que no se tienen los requerimientos funcionales y no funcionales ya definidos.</a:t>
+          </a:r>
+        </a:p>
+      </dsp:txBody>
+      <dsp:txXfrm>
+        <a:off x="4976163" y="1192106"/>
+        <a:ext cx="2881809" cy="3034453"/>
+      </dsp:txXfrm>
+    </dsp:sp>
+    <dsp:sp modelId="{DF4D5F54-F522-49E1-A722-411361FEEF39}">
+      <dsp:nvSpPr>
+        <dsp:cNvPr id="0" name=""/>
+        <dsp:cNvSpPr/>
+      </dsp:nvSpPr>
+      <dsp:spPr>
+        <a:xfrm rot="16200000">
+          <a:off x="-1075593" y="1396525"/>
+          <a:ext cx="3901440" cy="1108388"/>
+        </a:xfrm>
+        <a:prstGeom prst="rightArrow">
+          <a:avLst>
+            <a:gd name="adj1" fmla="val 49830"/>
+            <a:gd name="adj2" fmla="val 60660"/>
+          </a:avLst>
+        </a:prstGeom>
+        <a:solidFill>
+          <a:schemeClr val="accent1">
+            <a:tint val="50000"/>
+            <a:hueOff val="0"/>
+            <a:satOff val="0"/>
+            <a:lumOff val="0"/>
+            <a:alphaOff val="0"/>
+          </a:schemeClr>
+        </a:solidFill>
+        <a:ln w="15875" cap="flat" cmpd="sng" algn="ctr">
+          <a:solidFill>
+            <a:schemeClr val="lt1">
+              <a:hueOff val="0"/>
+              <a:satOff val="0"/>
+              <a:lumOff val="0"/>
+              <a:alphaOff val="0"/>
+            </a:schemeClr>
+          </a:solidFill>
+          <a:prstDash val="solid"/>
+        </a:ln>
+        <a:effectLst/>
+      </dsp:spPr>
+      <dsp:style>
+        <a:lnRef idx="2">
+          <a:scrgbClr r="0" g="0" b="0"/>
+        </a:lnRef>
+        <a:fillRef idx="1">
+          <a:scrgbClr r="0" g="0" b="0"/>
+        </a:fillRef>
+        <a:effectRef idx="0">
+          <a:scrgbClr r="0" g="0" b="0"/>
+        </a:effectRef>
+        <a:fontRef idx="minor"/>
+      </dsp:style>
+      <dsp:txBody>
+        <a:bodyPr spcFirstLastPara="0" vert="horz" wrap="square" lIns="99060" tIns="99060" rIns="99060" bIns="99060" numCol="1" spcCol="1270" anchor="ctr" anchorCtr="0">
+          <a:noAutofit/>
+        </a:bodyPr>
+        <a:lstStyle/>
+        <a:p>
+          <a:pPr marL="0" lvl="0" indent="0" algn="r" defTabSz="1155700">
+            <a:lnSpc>
+              <a:spcPct val="90000"/>
+            </a:lnSpc>
+            <a:spcBef>
+              <a:spcPct val="0"/>
+            </a:spcBef>
+            <a:spcAft>
+              <a:spcPct val="35000"/>
+            </a:spcAft>
+            <a:buNone/>
+          </a:pPr>
+          <a:r>
+            <a:rPr lang="es-ES" sz="2600" kern="1200" dirty="0"/>
+            <a:t>Pros</a:t>
+          </a:r>
+          <a:endParaRPr lang="es-MX" sz="2600" kern="1200" dirty="0"/>
+        </a:p>
+      </dsp:txBody>
+      <dsp:txXfrm>
+        <a:off x="-908078" y="1842080"/>
+        <a:ext cx="3566409" cy="552310"/>
+      </dsp:txXfrm>
+    </dsp:sp>
+    <dsp:sp modelId="{5980CF19-CC8E-4B7B-88BC-E2AAE3F05A8C}">
+      <dsp:nvSpPr>
+        <dsp:cNvPr id="0" name=""/>
+        <dsp:cNvSpPr/>
+      </dsp:nvSpPr>
+      <dsp:spPr>
+        <a:xfrm rot="5400000">
+          <a:off x="6683124" y="2913752"/>
+          <a:ext cx="3901440" cy="1108388"/>
+        </a:xfrm>
+        <a:prstGeom prst="rightArrow">
+          <a:avLst>
+            <a:gd name="adj1" fmla="val 49830"/>
+            <a:gd name="adj2" fmla="val 60660"/>
+          </a:avLst>
+        </a:prstGeom>
+        <a:solidFill>
+          <a:schemeClr val="accent1">
+            <a:tint val="50000"/>
+            <a:hueOff val="0"/>
+            <a:satOff val="0"/>
+            <a:lumOff val="0"/>
+            <a:alphaOff val="0"/>
+          </a:schemeClr>
+        </a:solidFill>
+        <a:ln w="15875" cap="flat" cmpd="sng" algn="ctr">
+          <a:solidFill>
+            <a:schemeClr val="lt1">
+              <a:hueOff val="0"/>
+              <a:satOff val="0"/>
+              <a:lumOff val="0"/>
+              <a:alphaOff val="0"/>
+            </a:schemeClr>
+          </a:solidFill>
+          <a:prstDash val="solid"/>
+        </a:ln>
+        <a:effectLst/>
+      </dsp:spPr>
+      <dsp:style>
+        <a:lnRef idx="2">
+          <a:scrgbClr r="0" g="0" b="0"/>
+        </a:lnRef>
+        <a:fillRef idx="1">
+          <a:scrgbClr r="0" g="0" b="0"/>
+        </a:fillRef>
+        <a:effectRef idx="0">
+          <a:scrgbClr r="0" g="0" b="0"/>
+        </a:effectRef>
+        <a:fontRef idx="minor"/>
+      </dsp:style>
+      <dsp:txBody>
+        <a:bodyPr spcFirstLastPara="0" vert="horz" wrap="square" lIns="99060" tIns="99060" rIns="99060" bIns="99060" numCol="1" spcCol="1270" anchor="ctr" anchorCtr="0">
+          <a:noAutofit/>
+        </a:bodyPr>
+        <a:lstStyle/>
+        <a:p>
+          <a:pPr marL="0" lvl="0" indent="0" algn="r" defTabSz="1155700">
+            <a:lnSpc>
+              <a:spcPct val="90000"/>
+            </a:lnSpc>
+            <a:spcBef>
+              <a:spcPct val="0"/>
+            </a:spcBef>
+            <a:spcAft>
+              <a:spcPct val="35000"/>
+            </a:spcAft>
+            <a:buNone/>
+          </a:pPr>
+          <a:r>
+            <a:rPr lang="es-ES" sz="2600" kern="1200" dirty="0"/>
+            <a:t>Contras</a:t>
+          </a:r>
+          <a:endParaRPr lang="es-MX" sz="2600" kern="1200" dirty="0"/>
+        </a:p>
+      </dsp:txBody>
+      <dsp:txXfrm>
+        <a:off x="6850640" y="3024276"/>
+        <a:ext cx="3566409" cy="552310"/>
+      </dsp:txXfrm>
+    </dsp:sp>
+  </dsp:spTree>
+</dsp:drawing>
+</file>
+
+<file path=ppt/diagrams/layout1.xml><?xml version="1.0" encoding="utf-8"?>
+<dgm:layoutDef xmlns:dgm="http://schemas.openxmlformats.org/drawingml/2006/diagram" xmlns:a="http://schemas.openxmlformats.org/drawingml/2006/main" uniqueId="urn:microsoft.com/office/officeart/2009/3/layout/OpposingIdeas">
+  <dgm:title val=""/>
+  <dgm:desc val=""/>
+  <dgm:catLst>
+    <dgm:cat type="relationship" pri="3400"/>
+  </dgm:catLst>
+  <dgm:sampData>
+    <dgm:dataModel>
+      <dgm:ptLst>
+        <dgm:pt modelId="0" type="doc"/>
+        <dgm:pt modelId="10">
+          <dgm:prSet phldr="1"/>
+        </dgm:pt>
+        <dgm:pt modelId="11">
+          <dgm:prSet phldr="1"/>
+        </dgm:pt>
+        <dgm:pt modelId="20">
+          <dgm:prSet phldr="1"/>
+        </dgm:pt>
+        <dgm:pt modelId="21">
+          <dgm:prSet phldr="1"/>
+        </dgm:pt>
+      </dgm:ptLst>
+      <dgm:cxnLst>
+        <dgm:cxn modelId="30" srcId="0" destId="10" srcOrd="0" destOrd="0"/>
+        <dgm:cxn modelId="12" srcId="10" destId="11" srcOrd="0" destOrd="0"/>
+        <dgm:cxn modelId="40" srcId="0" destId="20" srcOrd="1" destOrd="0"/>
+        <dgm:cxn modelId="22" srcId="20" destId="21" srcOrd="0" destOrd="0"/>
+      </dgm:cxnLst>
+      <dgm:bg/>
+      <dgm:whole/>
+    </dgm:dataModel>
+  </dgm:sampData>
+  <dgm:styleData>
+    <dgm:dataModel>
+      <dgm:ptLst>
+        <dgm:pt modelId="0" type="doc"/>
+        <dgm:pt modelId="10">
+          <dgm:prSet phldr="1"/>
+        </dgm:pt>
+        <dgm:pt modelId="11">
+          <dgm:prSet phldr="1"/>
+        </dgm:pt>
+        <dgm:pt modelId="20">
+          <dgm:prSet phldr="1"/>
+        </dgm:pt>
+        <dgm:pt modelId="21">
+          <dgm:prSet phldr="1"/>
+        </dgm:pt>
+      </dgm:ptLst>
+      <dgm:cxnLst>
+        <dgm:cxn modelId="30" srcId="0" destId="10" srcOrd="0" destOrd="0"/>
+        <dgm:cxn modelId="12" srcId="10" destId="11" srcOrd="0" destOrd="0"/>
+        <dgm:cxn modelId="40" srcId="0" destId="20" srcOrd="1" destOrd="0"/>
+        <dgm:cxn modelId="22" srcId="20" destId="21" srcOrd="0" destOrd="0"/>
+      </dgm:cxnLst>
+      <dgm:bg/>
+      <dgm:whole/>
+    </dgm:dataModel>
+  </dgm:styleData>
+  <dgm:clrData>
+    <dgm:dataModel>
+      <dgm:ptLst>
+        <dgm:pt modelId="0" type="doc"/>
+        <dgm:pt modelId="10">
+          <dgm:prSet phldr="1"/>
+        </dgm:pt>
+        <dgm:pt modelId="11">
+          <dgm:prSet phldr="1"/>
+        </dgm:pt>
+        <dgm:pt modelId="20">
+          <dgm:prSet phldr="1"/>
+        </dgm:pt>
+        <dgm:pt modelId="21">
+          <dgm:prSet phldr="1"/>
+        </dgm:pt>
+      </dgm:ptLst>
+      <dgm:cxnLst>
+        <dgm:cxn modelId="30" srcId="0" destId="10" srcOrd="0" destOrd="0"/>
+        <dgm:cxn modelId="12" srcId="10" destId="11" srcOrd="0" destOrd="0"/>
+        <dgm:cxn modelId="40" srcId="0" destId="20" srcOrd="1" destOrd="0"/>
+        <dgm:cxn modelId="22" srcId="20" destId="21" srcOrd="0" destOrd="0"/>
+      </dgm:cxnLst>
+      <dgm:bg/>
+      <dgm:whole/>
+    </dgm:dataModel>
+  </dgm:clrData>
+  <dgm:layoutNode name="Name0">
+    <dgm:varLst>
+      <dgm:chMax val="2"/>
+      <dgm:dir/>
+      <dgm:animOne val="branch"/>
+      <dgm:animLvl val="lvl"/>
+      <dgm:resizeHandles val="exact"/>
+    </dgm:varLst>
+    <dgm:choose name="Name1">
+      <dgm:if name="Name2" axis="ch" ptType="node" func="cnt" op="lte" val="1">
+        <dgm:alg type="composite">
+          <dgm:param type="ar" val="0.9928"/>
+        </dgm:alg>
+      </dgm:if>
+      <dgm:else name="Name3">
+        <dgm:alg type="composite">
+          <dgm:param type="ar" val="1.6364"/>
+        </dgm:alg>
+      </dgm:else>
+    </dgm:choose>
+    <dgm:shape xmlns:r="http://schemas.openxmlformats.org/officeDocument/2006/relationships" r:blip="">
+      <dgm:adjLst/>
+    </dgm:shape>
+    <dgm:choose name="Name4">
+      <dgm:if name="Name5" func="var" arg="dir" op="equ" val="norm">
+        <dgm:choose name="Name6">
+          <dgm:if name="Name7" axis="ch" ptType="node" func="cnt" op="lte" val="1">
+            <dgm:constrLst>
+              <dgm:constr type="primFontSz" for="des" forName="ParentText1" op="equ" val="65"/>
+              <dgm:constr type="primFontSz" for="des" forName="ParentText2" refType="primFontSz" refFor="des" refForName="ParentText1" op="equ"/>
+              <dgm:constr type="primFontSz" for="des" forName="ChildText1" op="equ" val="65"/>
+              <dgm:constr type="primFontSz" for="des" forName="ChildText2" refType="primFontSz" refFor="des" refForName="ChildText1" op="equ"/>
+              <dgm:constr type="l" for="ch" forName="ChildText1" refType="w" fact="0.2963"/>
+              <dgm:constr type="t" for="ch" forName="ChildText1" refType="h" fact="0.2722"/>
+              <dgm:constr type="w" for="ch" forName="ChildText1" refType="w" fact="0.6534"/>
+              <dgm:constr type="h" for="ch" forName="ChildText1" refType="h" fact="0.6682"/>
+              <dgm:constr type="l" for="ch" forName="Background" refType="w" fact="0.246"/>
+              <dgm:constr type="t" for="ch" forName="Background" refType="h" fact="0.2125"/>
+              <dgm:constr type="w" for="ch" forName="Background" refType="w" fact="0.754"/>
+              <dgm:constr type="h" for="ch" forName="Background" refType="h" fact="0.7875"/>
+              <dgm:constr type="l" for="ch" forName="ParentText1" refType="w" fact="0"/>
+              <dgm:constr type="t" for="ch" forName="ParentText1" refType="h" fact="0"/>
+              <dgm:constr type="w" for="ch" forName="ParentText1" refType="w" fact="0.234"/>
+              <dgm:constr type="h" for="ch" forName="ParentText1" refType="h" fact="0.8713"/>
+              <dgm:constr type="l" for="ch" forName="ParentShape1" refType="w" fact="0"/>
+              <dgm:constr type="t" for="ch" forName="ParentShape1" refType="h" fact="0"/>
+              <dgm:constr type="w" for="ch" forName="ParentShape1" refType="w" fact="0.234"/>
+              <dgm:constr type="h" for="ch" forName="ParentShape1" refType="h" fact="0.8713"/>
+            </dgm:constrLst>
+          </dgm:if>
+          <dgm:else name="Name8">
+            <dgm:constrLst>
+              <dgm:constr type="primFontSz" for="des" forName="ParentText1" op="equ" val="65"/>
+              <dgm:constr type="primFontSz" for="des" forName="ParentText2" refType="primFontSz" refFor="des" refForName="ParentText1" op="equ"/>
+              <dgm:constr type="primFontSz" for="des" forName="ChildText1" op="equ" val="65"/>
+              <dgm:constr type="primFontSz" for="des" forName="ChildText2" refType="primFontSz" refFor="des" refForName="ChildText1" op="equ"/>
+              <dgm:constr type="l" for="ch" forName="ChildText1" refType="w" fact="0.15"/>
+              <dgm:constr type="t" for="ch" forName="ChildText1" refType="h" fact="0.22"/>
+              <dgm:constr type="w" for="ch" forName="ChildText1" refType="w" fact="0.325"/>
+              <dgm:constr type="h" for="ch" forName="ChildText1" refType="h" fact="0.56"/>
+              <dgm:constr type="l" for="ch" forName="ChildText2" refType="w" fact="0.525"/>
+              <dgm:constr type="t" for="ch" forName="ChildText2" refType="h" fact="0.22"/>
+              <dgm:constr type="w" for="ch" forName="ChildText2" refType="w" fact="0.325"/>
+              <dgm:constr type="h" for="ch" forName="ChildText2" refType="h" fact="0.56"/>
+              <dgm:constr type="l" for="ch" forName="Background" refType="w" fact="0.125"/>
+              <dgm:constr type="t" for="ch" forName="Background" refType="h" fact="0.17"/>
+              <dgm:constr type="w" for="ch" forName="Background" refType="w" fact="0.75"/>
+              <dgm:constr type="h" for="ch" forName="Background" refType="h" fact="0.66"/>
+              <dgm:constr type="l" for="ch" forName="ParentText1" refType="w" fact="0"/>
+              <dgm:constr type="t" for="ch" forName="ParentText1" refType="h" fact="0"/>
+              <dgm:constr type="w" for="ch" forName="ParentText1" refType="w" fact="0.125"/>
+              <dgm:constr type="h" for="ch" forName="ParentText1" refType="h" fact="0.72"/>
+              <dgm:constr type="l" for="ch" forName="ParentShape1" refType="w" fact="0"/>
+              <dgm:constr type="t" for="ch" forName="ParentShape1" refType="h" fact="0"/>
+              <dgm:constr type="w" for="ch" forName="ParentShape1" refType="w" fact="0.125"/>
+              <dgm:constr type="h" for="ch" forName="ParentShape1" refType="h" fact="0.72"/>
+              <dgm:constr type="l" for="ch" forName="ParentText2" refType="w" fact="0.875"/>
+              <dgm:constr type="t" for="ch" forName="ParentText2" refType="h" fact="0.28"/>
+              <dgm:constr type="w" for="ch" forName="ParentText2" refType="w" fact="0.125"/>
+              <dgm:constr type="h" for="ch" forName="ParentText2" refType="h" fact="0.72"/>
+              <dgm:constr type="l" for="ch" forName="ParentShape2" refType="w" fact="0.875"/>
+              <dgm:constr type="t" for="ch" forName="ParentShape2" refType="h" fact="0.28"/>
+              <dgm:constr type="w" for="ch" forName="ParentShape2" refType="w" fact="0.125"/>
+              <dgm:constr type="h" for="ch" forName="ParentShape2" refType="h" fact="0.72"/>
+              <dgm:constr type="l" for="ch" forName="Divider" refType="w" fact="0.5"/>
+              <dgm:constr type="t" for="ch" forName="Divider" refType="h" fact="0.24"/>
+              <dgm:constr type="w" for="ch" forName="Divider" refType="w" fact="0.0001"/>
+              <dgm:constr type="h" for="ch" forName="Divider" refType="h" fact="0.52"/>
+            </dgm:constrLst>
+          </dgm:else>
+        </dgm:choose>
+      </dgm:if>
+      <dgm:else name="Name9">
+        <dgm:choose name="Name10">
+          <dgm:if name="Name11" axis="ch" ptType="node" func="cnt" op="lte" val="1">
+            <dgm:constrLst>
+              <dgm:constr type="primFontSz" for="des" forName="ParentText1" op="equ" val="65"/>
+              <dgm:constr type="primFontSz" for="des" forName="ParentText2" refType="primFontSz" refFor="des" refForName="ParentText1" op="equ"/>
+              <dgm:constr type="primFontSz" for="des" forName="ChildText1" op="equ" val="65"/>
+              <dgm:constr type="primFontSz" for="des" forName="ChildText2" refType="primFontSz" refFor="des" refForName="ChildText1" op="equ"/>
+              <dgm:constr type="r" for="ch" forName="ChildText1" refType="w" fact="-0.2455"/>
+              <dgm:constr type="t" for="ch" forName="ChildText1" refType="h" fact="0.2651"/>
+              <dgm:constr type="w" for="ch" forName="ChildText1" refType="w" fact="0.5351"/>
+              <dgm:constr type="h" for="ch" forName="ChildText1" refType="h" fact="0.56"/>
+              <dgm:constr type="r" for="ch" forName="Background" refType="w" fact="-0.246"/>
+              <dgm:constr type="t" for="ch" forName="Background" refType="h" fact="0.2125"/>
+              <dgm:constr type="w" for="ch" forName="Background" refType="w" fact="0.754"/>
+              <dgm:constr type="h" for="ch" forName="Background" refType="h" fact="0.7875"/>
+              <dgm:constr type="r" for="ch" forName="ParentText1" refType="w" fact="0"/>
+              <dgm:constr type="t" for="ch" forName="ParentText1" refType="h" fact="0"/>
+              <dgm:constr type="w" for="ch" forName="ParentText1" refType="w" fact="0.234"/>
+              <dgm:constr type="h" for="ch" forName="ParentText1" refType="h" fact="0.8713"/>
+              <dgm:constr type="r" for="ch" forName="ParentShape1" refType="w" fact="0"/>
+              <dgm:constr type="t" for="ch" forName="ParentShape1" refType="h" fact="0"/>
+              <dgm:constr type="w" for="ch" forName="ParentShape1" refType="w" fact="0.234"/>
+              <dgm:constr type="h" for="ch" forName="ParentShape1" refType="h" fact="0.8713"/>
+            </dgm:constrLst>
+          </dgm:if>
+          <dgm:else name="Name12">
+            <dgm:constrLst>
+              <dgm:constr type="primFontSz" for="des" forName="ParentText1" op="equ" val="65"/>
+              <dgm:constr type="primFontSz" for="des" forName="ParentText2" refType="primFontSz" refFor="des" refForName="ParentText1" op="equ"/>
+              <dgm:constr type="primFontSz" for="des" forName="ChildText1" op="equ" val="65"/>
+              <dgm:constr type="primFontSz" for="des" forName="ChildText2" refType="primFontSz" refFor="des" refForName="ChildText1" op="equ"/>
+              <dgm:constr type="r" for="ch" forName="ChildText1" refType="w" fact="-0.15"/>
+              <dgm:constr type="t" for="ch" forName="ChildText1" refType="h" fact="0.22"/>
+              <dgm:constr type="w" for="ch" forName="ChildText1" refType="w" fact="0.325"/>
+              <dgm:constr type="h" for="ch" forName="ChildText1" refType="h" fact="0.56"/>
+              <dgm:constr type="r" for="ch" forName="ChildText2" refType="w" fact="-0.525"/>
+              <dgm:constr type="t" for="ch" forName="ChildText2" refType="h" fact="0.22"/>
+              <dgm:constr type="w" for="ch" forName="ChildText2" refType="w" fact="0.325"/>
+              <dgm:constr type="h" for="ch" forName="ChildText2" refType="h" fact="0.56"/>
+              <dgm:constr type="r" for="ch" forName="Background" refType="w" fact="-0.125"/>
+              <dgm:constr type="t" for="ch" forName="Background" refType="h" fact="0.17"/>
+              <dgm:constr type="w" for="ch" forName="Background" refType="w" fact="0.75"/>
+              <dgm:constr type="h" for="ch" forName="Background" refType="h" fact="0.66"/>
+              <dgm:constr type="r" for="ch" forName="ParentText1" refType="w" fact="0"/>
+              <dgm:constr type="t" for="ch" forName="ParentText1" refType="h" fact="0"/>
+              <dgm:constr type="w" for="ch" forName="ParentText1" refType="w" fact="0.125"/>
+              <dgm:constr type="h" for="ch" forName="ParentText1" refType="h" fact="0.72"/>
+              <dgm:constr type="r" for="ch" forName="ParentShape1" refType="w" fact="0"/>
+              <dgm:constr type="t" for="ch" forName="ParentShape1" refType="h" fact="0"/>
+              <dgm:constr type="w" for="ch" forName="ParentShape1" refType="w" fact="0.125"/>
+              <dgm:constr type="h" for="ch" forName="ParentShape1" refType="h" fact="0.72"/>
+              <dgm:constr type="r" for="ch" forName="ParentText2" refType="w" fact="-0.875"/>
+              <dgm:constr type="t" for="ch" forName="ParentText2" refType="h" fact="0.28"/>
+              <dgm:constr type="w" for="ch" forName="ParentText2" refType="w" fact="0.125"/>
+              <dgm:constr type="h" for="ch" forName="ParentText2" refType="h" fact="0.72"/>
+              <dgm:constr type="r" for="ch" forName="ParentShape2" refType="w" fact="-0.875"/>
+              <dgm:constr type="t" for="ch" forName="ParentShape2" refType="h" fact="0.28"/>
+              <dgm:constr type="w" for="ch" forName="ParentShape2" refType="w" fact="0.125"/>
+              <dgm:constr type="h" for="ch" forName="ParentShape2" refType="h" fact="0.72"/>
+              <dgm:constr type="r" for="ch" forName="Divider" refType="w" fact="-0.5"/>
+              <dgm:constr type="t" for="ch" forName="Divider" refType="h" fact="0.24"/>
+              <dgm:constr type="w" for="ch" forName="Divider" refType="w" fact="0.0001"/>
+              <dgm:constr type="h" for="ch" forName="Divider" refType="h" fact="0.52"/>
+            </dgm:constrLst>
+          </dgm:else>
+        </dgm:choose>
+      </dgm:else>
+    </dgm:choose>
+    <dgm:choose name="Name13">
+      <dgm:if name="Name14" axis="ch" ptType="node" func="cnt" op="gte" val="1">
+        <dgm:layoutNode name="Background" styleLbl="node1">
+          <dgm:alg type="sp"/>
+          <dgm:choose name="Name15">
+            <dgm:if name="Name16" func="var" arg="dir" op="equ" val="norm">
+              <dgm:shape xmlns:r="http://schemas.openxmlformats.org/officeDocument/2006/relationships" type="round2DiagRect" r:blip="">
+                <dgm:adjLst>
+                  <dgm:adj idx="1" val="0"/>
+                  <dgm:adj idx="2" val="0.1667"/>
+                </dgm:adjLst>
+              </dgm:shape>
+            </dgm:if>
+            <dgm:else name="Name17">
+              <dgm:shape xmlns:r="http://schemas.openxmlformats.org/officeDocument/2006/relationships" type="round2DiagRect" r:blip="">
+                <dgm:adjLst>
+                  <dgm:adj idx="1" val="0.1667"/>
+                  <dgm:adj idx="2" val="0"/>
+                </dgm:adjLst>
+              </dgm:shape>
+            </dgm:else>
+          </dgm:choose>
+          <dgm:presOf/>
+        </dgm:layoutNode>
+        <dgm:choose name="Name18">
+          <dgm:if name="Name19" axis="ch" ptType="node" func="cnt" op="gte" val="2">
+            <dgm:layoutNode name="Divider" styleLbl="callout">
+              <dgm:alg type="sp"/>
+              <dgm:shape xmlns:r="http://schemas.openxmlformats.org/officeDocument/2006/relationships" type="line" r:blip="">
+                <dgm:adjLst/>
+              </dgm:shape>
+              <dgm:presOf/>
+            </dgm:layoutNode>
+          </dgm:if>
+          <dgm:else name="Name20"/>
+        </dgm:choose>
+        <dgm:layoutNode name="ChildText1" styleLbl="revTx">
+          <dgm:varLst>
+            <dgm:chMax val="0"/>
+            <dgm:chPref val="0"/>
+            <dgm:bulletEnabled val="1"/>
+          </dgm:varLst>
+          <dgm:alg type="tx">
+            <dgm:param type="parTxLTRAlign" val="l"/>
+            <dgm:param type="txAnchorVert" val="t"/>
+          </dgm:alg>
+          <dgm:shape xmlns:r="http://schemas.openxmlformats.org/officeDocument/2006/relationships" type="rect" r:blip="" hideGeom="1">
+            <dgm:adjLst/>
+          </dgm:shape>
+          <dgm:presOf axis="ch des" ptType="node node" st="1 1" cnt="1 0"/>
+          <dgm:constrLst>
+            <dgm:constr type="lMarg" refType="primFontSz" fact="0.3"/>
+            <dgm:constr type="rMarg" refType="primFontSz" fact="0.3"/>
+            <dgm:constr type="tMarg" refType="primFontSz" fact="0.3"/>
+            <dgm:constr type="bMarg" refType="primFontSz" fact="0.3"/>
+          </dgm:constrLst>
+          <dgm:ruleLst>
+            <dgm:rule type="primFontSz" val="5" fact="NaN" max="NaN"/>
+          </dgm:ruleLst>
+        </dgm:layoutNode>
+        <dgm:choose name="Name21">
+          <dgm:if name="Name22" axis="ch" ptType="node" func="cnt" op="gte" val="2">
+            <dgm:layoutNode name="ChildText2" styleLbl="revTx">
+              <dgm:varLst>
+                <dgm:chMax val="0"/>
+                <dgm:chPref val="0"/>
+                <dgm:bulletEnabled val="1"/>
+              </dgm:varLst>
+              <dgm:alg type="tx">
+                <dgm:param type="parTxLTRAlign" val="l"/>
+                <dgm:param type="txAnchorVert" val="t"/>
+              </dgm:alg>
+              <dgm:shape xmlns:r="http://schemas.openxmlformats.org/officeDocument/2006/relationships" type="rect" r:blip="" hideGeom="1">
+                <dgm:adjLst/>
+              </dgm:shape>
+              <dgm:presOf axis="ch des" ptType="node node" st="2 1" cnt="1 0"/>
+              <dgm:constrLst>
+                <dgm:constr type="lMarg" refType="primFontSz" fact="0.3"/>
+                <dgm:constr type="rMarg" refType="primFontSz" fact="0.3"/>
+                <dgm:constr type="tMarg" refType="primFontSz" fact="0.3"/>
+                <dgm:constr type="bMarg" refType="primFontSz" fact="0.3"/>
+              </dgm:constrLst>
+              <dgm:ruleLst>
+                <dgm:rule type="primFontSz" val="5" fact="NaN" max="NaN"/>
+              </dgm:ruleLst>
+            </dgm:layoutNode>
+          </dgm:if>
+          <dgm:else name="Name23"/>
+        </dgm:choose>
+        <dgm:layoutNode name="ParentText1" styleLbl="revTx">
+          <dgm:varLst>
+            <dgm:chMax val="1"/>
+            <dgm:chPref val="1"/>
+          </dgm:varLst>
+          <dgm:choose name="Name24">
+            <dgm:if name="Name25" func="var" arg="dir" op="equ" val="norm">
+              <dgm:alg type="tx">
+                <dgm:param type="parTxLTRAlign" val="r"/>
+                <dgm:param type="shpTxLTRAlignCh" val="r"/>
+                <dgm:param type="txAnchorVertCh" val="mid"/>
+                <dgm:param type="autoTxRot" val="grav"/>
+              </dgm:alg>
+            </dgm:if>
+            <dgm:else name="Name26">
+              <dgm:alg type="tx">
+                <dgm:param type="parTxLTRAlign" val="l"/>
+                <dgm:param type="shpTxLTRAlignCh" val="r"/>
+                <dgm:param type="txAnchorVertCh" val="mid"/>
+                <dgm:param type="autoTxRot" val="grav"/>
+              </dgm:alg>
+            </dgm:else>
+          </dgm:choose>
+          <dgm:choose name="Name27">
+            <dgm:if name="Name28" func="var" arg="dir" op="equ" val="norm">
+              <dgm:shape xmlns:r="http://schemas.openxmlformats.org/officeDocument/2006/relationships" rot="-90" type="rightArrow" r:blip="" hideGeom="1">
+                <dgm:adjLst>
+                  <dgm:adj idx="1" val="0.4983"/>
+                  <dgm:adj idx="2" val="0.6066"/>
+                </dgm:adjLst>
+              </dgm:shape>
+            </dgm:if>
+            <dgm:else name="Name29">
+              <dgm:shape xmlns:r="http://schemas.openxmlformats.org/officeDocument/2006/relationships" rot="90" type="leftArrow" r:blip="" hideGeom="1">
+                <dgm:adjLst>
+                  <dgm:adj idx="1" val="0.4983"/>
+                  <dgm:adj idx="2" val="0.6066"/>
+                </dgm:adjLst>
+              </dgm:shape>
+            </dgm:else>
+          </dgm:choose>
+          <dgm:presOf axis="ch self" ptType="node node" st="1 1" cnt="1 0"/>
+          <dgm:constrLst>
+            <dgm:constr type="lMarg" refType="primFontSz" fact="0.3"/>
+            <dgm:constr type="rMarg" refType="primFontSz" fact="0.3"/>
+            <dgm:constr type="tMarg" refType="primFontSz" fact="0.3"/>
+            <dgm:constr type="bMarg" refType="primFontSz" fact="0.3"/>
+          </dgm:constrLst>
+          <dgm:ruleLst>
+            <dgm:rule type="primFontSz" val="5" fact="NaN" max="NaN"/>
+          </dgm:ruleLst>
+        </dgm:layoutNode>
+        <dgm:layoutNode name="ParentShape1" styleLbl="alignImgPlace1">
+          <dgm:varLst/>
+          <dgm:alg type="sp"/>
+          <dgm:presOf axis="ch self" ptType="node node" st="1 1" cnt="1 0"/>
+          <dgm:choose name="Name30">
+            <dgm:if name="Name31" func="var" arg="dir" op="equ" val="norm">
+              <dgm:shape xmlns:r="http://schemas.openxmlformats.org/officeDocument/2006/relationships" rot="-90" type="rightArrow" r:blip="">
+                <dgm:adjLst>
+                  <dgm:adj idx="1" val="0.4983"/>
+                  <dgm:adj idx="2" val="0.6066"/>
+                </dgm:adjLst>
+              </dgm:shape>
+            </dgm:if>
+            <dgm:else name="Name32">
+              <dgm:shape xmlns:r="http://schemas.openxmlformats.org/officeDocument/2006/relationships" rot="90" type="leftArrow" r:blip="">
+                <dgm:adjLst>
+                  <dgm:adj idx="1" val="0.4983"/>
+                  <dgm:adj idx="2" val="0.6066"/>
+                </dgm:adjLst>
+              </dgm:shape>
+            </dgm:else>
+          </dgm:choose>
+        </dgm:layoutNode>
+        <dgm:choose name="Name33">
+          <dgm:if name="Name34" axis="ch" ptType="node" func="cnt" op="gte" val="2">
+            <dgm:layoutNode name="ParentText2" styleLbl="revTx">
+              <dgm:varLst>
+                <dgm:chMax val="1"/>
+                <dgm:chPref val="1"/>
+              </dgm:varLst>
+              <dgm:choose name="Name35">
+                <dgm:if name="Name36" func="var" arg="dir" op="equ" val="norm">
+                  <dgm:alg type="tx">
+                    <dgm:param type="parTxLTRAlign" val="r"/>
+                    <dgm:param type="shpTxLTRAlignCh" val="r"/>
+                    <dgm:param type="txAnchorVertCh" val="mid"/>
+                    <dgm:param type="autoTxRot" val="grav"/>
+                  </dgm:alg>
+                </dgm:if>
+                <dgm:else name="Name37">
+                  <dgm:alg type="tx">
+                    <dgm:param type="parTxLTRAlign" val="l"/>
+                    <dgm:param type="shpTxLTRAlignCh" val="r"/>
+                    <dgm:param type="txAnchorVertCh" val="mid"/>
+                    <dgm:param type="autoTxRot" val="grav"/>
+                  </dgm:alg>
+                </dgm:else>
+              </dgm:choose>
+              <dgm:choose name="Name38">
+                <dgm:if name="Name39" func="var" arg="dir" op="equ" val="norm">
+                  <dgm:shape xmlns:r="http://schemas.openxmlformats.org/officeDocument/2006/relationships" rot="90" type="rightArrow" r:blip="" hideGeom="1">
+                    <dgm:adjLst>
+                      <dgm:adj idx="1" val="0.4983"/>
+                      <dgm:adj idx="2" val="0.6066"/>
+                    </dgm:adjLst>
+                  </dgm:shape>
+                </dgm:if>
+                <dgm:else name="Name40">
+                  <dgm:shape xmlns:r="http://schemas.openxmlformats.org/officeDocument/2006/relationships" rot="-90" type="leftArrow" r:blip="" hideGeom="1">
+                    <dgm:adjLst>
+                      <dgm:adj idx="1" val="0.4983"/>
+                      <dgm:adj idx="2" val="0.6066"/>
+                    </dgm:adjLst>
+                  </dgm:shape>
+                </dgm:else>
+              </dgm:choose>
+              <dgm:presOf axis="ch self" ptType="node node" st="2 1" cnt="1 0"/>
+              <dgm:constrLst>
+                <dgm:constr type="lMarg" refType="primFontSz" fact="0.3"/>
+                <dgm:constr type="rMarg" refType="primFontSz" fact="0.3"/>
+                <dgm:constr type="tMarg" refType="primFontSz" fact="0.3"/>
+                <dgm:constr type="bMarg" refType="primFontSz" fact="0.3"/>
+              </dgm:constrLst>
+              <dgm:ruleLst>
+                <dgm:rule type="primFontSz" val="5" fact="NaN" max="NaN"/>
+              </dgm:ruleLst>
+            </dgm:layoutNode>
+            <dgm:layoutNode name="ParentShape2" styleLbl="alignImgPlace1">
+              <dgm:varLst/>
+              <dgm:alg type="sp"/>
+              <dgm:choose name="Name41">
+                <dgm:if name="Name42" func="var" arg="dir" op="equ" val="norm">
+                  <dgm:shape xmlns:r="http://schemas.openxmlformats.org/officeDocument/2006/relationships" rot="90" type="rightArrow" r:blip="">
+                    <dgm:adjLst>
+                      <dgm:adj idx="1" val="0.4983"/>
+                      <dgm:adj idx="2" val="0.6066"/>
+                    </dgm:adjLst>
+                  </dgm:shape>
+                </dgm:if>
+                <dgm:else name="Name43">
+                  <dgm:shape xmlns:r="http://schemas.openxmlformats.org/officeDocument/2006/relationships" rot="-90" type="leftArrow" r:blip="">
+                    <dgm:adjLst>
+                      <dgm:adj idx="1" val="0.4983"/>
+                      <dgm:adj idx="2" val="0.6066"/>
+                    </dgm:adjLst>
+                  </dgm:shape>
+                </dgm:else>
+              </dgm:choose>
+              <dgm:presOf axis="ch self" ptType="node node" st="2 1" cnt="1 0"/>
+            </dgm:layoutNode>
+          </dgm:if>
+          <dgm:else name="Name44"/>
+        </dgm:choose>
+      </dgm:if>
+      <dgm:else name="Name45"/>
+    </dgm:choose>
+  </dgm:layoutNode>
+</dgm:layoutDef>
+</file>
+
+<file path=ppt/diagrams/quickStyle1.xml><?xml version="1.0" encoding="utf-8"?>
+<dgm:styleDef xmlns:dgm="http://schemas.openxmlformats.org/drawingml/2006/diagram" xmlns:a="http://schemas.openxmlformats.org/drawingml/2006/main" uniqueId="urn:microsoft.com/office/officeart/2005/8/quickstyle/simple1">
+  <dgm:title val=""/>
+  <dgm:desc val=""/>
+  <dgm:catLst>
+    <dgm:cat type="simple" pri="10100"/>
+  </dgm:catLst>
+  <dgm:scene3d>
+    <a:camera prst="orthographicFront"/>
+    <a:lightRig rig="threePt" dir="t"/>
+  </dgm:scene3d>
+  <dgm:styleLbl name="node0">
+    <dgm:scene3d>
+      <a:camera prst="orthographicFront"/>
+      <a:lightRig rig="threePt" dir="t"/>
+    </dgm:scene3d>
+    <dgm:sp3d/>
+    <dgm:txPr/>
+    <dgm:style>
+      <a:lnRef idx="2">
+        <a:scrgbClr r="0" g="0" b="0"/>
+      </a:lnRef>
+      <a:fillRef idx="1">
+        <a:scrgbClr r="0" g="0" b="0"/>
+      </a:fillRef>
+      <a:effectRef idx="0">
+        <a:scrgbClr r="0" g="0" b="0"/>
+      </a:effectRef>
+      <a:fontRef idx="minor">
+        <a:schemeClr val="lt1"/>
+      </a:fontRef>
+    </dgm:style>
+  </dgm:styleLbl>
+  <dgm:styleLbl name="lnNode1">
+    <dgm:scene3d>
+      <a:camera prst="orthographicFront"/>
+      <a:lightRig rig="threePt" dir="t"/>
+    </dgm:scene3d>
+    <dgm:sp3d/>
+    <dgm:txPr/>
+    <dgm:style>
+      <a:lnRef idx="2">
+        <a:scrgbClr r="0" g="0" b="0"/>
+      </a:lnRef>
+      <a:fillRef idx="1">
+        <a:scrgbClr r="0" g="0" b="0"/>
+      </a:fillRef>
+      <a:effectRef idx="0">
+        <a:scrgbClr r="0" g="0" b="0"/>
+      </a:effectRef>
+      <a:fontRef idx="minor">
+        <a:schemeClr val="lt1"/>
+      </a:fontRef>
+    </dgm:style>
+  </dgm:styleLbl>
+  <dgm:styleLbl name="vennNode1">
+    <dgm:scene3d>
+      <a:camera prst="orthographicFront"/>
+      <a:lightRig rig="threePt" dir="t"/>
+    </dgm:scene3d>
+    <dgm:sp3d/>
+    <dgm:txPr/>
+    <dgm:style>
+      <a:lnRef idx="2">
+        <a:scrgbClr r="0" g="0" b="0"/>
+      </a:lnRef>
+      <a:fillRef idx="1">
+        <a:scrgbClr r="0" g="0" b="0"/>
+      </a:fillRef>
+      <a:effectRef idx="0">
+        <a:scrgbClr r="0" g="0" b="0"/>
+      </a:effectRef>
+      <a:fontRef idx="minor">
+        <a:schemeClr val="tx1"/>
+      </a:fontRef>
+    </dgm:style>
+  </dgm:styleLbl>
+  <dgm:styleLbl name="alignNode1">
+    <dgm:scene3d>
+      <a:camera prst="orthographicFront"/>
+      <a:lightRig rig="threePt" dir="t"/>
+    </dgm:scene3d>
+    <dgm:sp3d/>
+    <dgm:txPr/>
+    <dgm:style>
+      <a:lnRef idx="2">
+        <a:scrgbClr r="0" g="0" b="0"/>
+      </a:lnRef>
+      <a:fillRef idx="1">
+        <a:scrgbClr r="0" g="0" b="0"/>
+      </a:fillRef>
+      <a:effectRef idx="0">
+        <a:scrgbClr r="0" g="0" b="0"/>
+      </a:effectRef>
+      <a:fontRef idx="minor">
+        <a:schemeClr val="lt1"/>
+      </a:fontRef>
+    </dgm:style>
+  </dgm:styleLbl>
+  <dgm:styleLbl name="node1">
+    <dgm:scene3d>
+      <a:camera prst="orthographicFront"/>
+      <a:lightRig rig="threePt" dir="t"/>
+    </dgm:scene3d>
+    <dgm:sp3d/>
+    <dgm:txPr/>
+    <dgm:style>
+      <a:lnRef idx="2">
+        <a:scrgbClr r="0" g="0" b="0"/>
+      </a:lnRef>
+      <a:fillRef idx="1">
+        <a:scrgbClr r="0" g="0" b="0"/>
+      </a:fillRef>
+      <a:effectRef idx="0">
+        <a:scrgbClr r="0" g="0" b="0"/>
+      </a:effectRef>
+      <a:fontRef idx="minor">
+        <a:schemeClr val="lt1"/>
+      </a:fontRef>
+    </dgm:style>
+  </dgm:styleLbl>
+  <dgm:styleLbl name="node2">
+    <dgm:scene3d>
+      <a:camera prst="orthographicFront"/>
+      <a:lightRig rig="threePt" dir="t"/>
+    </dgm:scene3d>
+    <dgm:sp3d/>
+    <dgm:txPr/>
+    <dgm:style>
+      <a:lnRef idx="2">
+        <a:scrgbClr r="0" g="0" b="0"/>
+      </a:lnRef>
+      <a:fillRef idx="1">
+        <a:scrgbClr r="0" g="0" b="0"/>
+      </a:fillRef>
+      <a:effectRef idx="0">
+        <a:scrgbClr r="0" g="0" b="0"/>
+      </a:effectRef>
+      <a:fontRef idx="minor">
+        <a:schemeClr val="lt1"/>
+      </a:fontRef>
+    </dgm:style>
+  </dgm:styleLbl>
+  <dgm:styleLbl name="node3">
+    <dgm:scene3d>
+      <a:camera prst="orthographicFront"/>
+      <a:lightRig rig="threePt" dir="t"/>
+    </dgm:scene3d>
+    <dgm:sp3d/>
+    <dgm:txPr/>
+    <dgm:style>
+      <a:lnRef idx="2">
+        <a:scrgbClr r="0" g="0" b="0"/>
+      </a:lnRef>
+      <a:fillRef idx="1">
+        <a:scrgbClr r="0" g="0" b="0"/>
+      </a:fillRef>
+      <a:effectRef idx="0">
+        <a:scrgbClr r="0" g="0" b="0"/>
+      </a:effectRef>
+      <a:fontRef idx="minor">
+        <a:schemeClr val="lt1"/>
+      </a:fontRef>
+    </dgm:style>
+  </dgm:styleLbl>
+  <dgm:styleLbl name="node4">
+    <dgm:scene3d>
+      <a:camera prst="orthographicFront"/>
+      <a:lightRig rig="threePt" dir="t"/>
+    </dgm:scene3d>
+    <dgm:sp3d/>
+    <dgm:txPr/>
+    <dgm:style>
+      <a:lnRef idx="2">
+        <a:scrgbClr r="0" g="0" b="0"/>
+      </a:lnRef>
+      <a:fillRef idx="1">
+        <a:scrgbClr r="0" g="0" b="0"/>
+      </a:fillRef>
+      <a:effectRef idx="0">
+        <a:scrgbClr r="0" g="0" b="0"/>
+      </a:effectRef>
+      <a:fontRef idx="minor">
+        <a:schemeClr val="lt1"/>
+      </a:fontRef>
+    </dgm:style>
+  </dgm:styleLbl>
+  <dgm:styleLbl name="fgImgPlace1">
+    <dgm:scene3d>
+      <a:camera prst="orthographicFront"/>
+      <a:lightRig rig="threePt" dir="t"/>
+    </dgm:scene3d>
+    <dgm:sp3d/>
+    <dgm:txPr/>
+    <dgm:style>
+      <a:lnRef idx="2">
+        <a:scrgbClr r="0" g="0" b="0"/>
+      </a:lnRef>
+      <a:fillRef idx="1">
+        <a:scrgbClr r="0" g="0" b="0"/>
+      </a:fillRef>
+      <a:effectRef idx="0">
+        <a:scrgbClr r="0" g="0" b="0"/>
+      </a:effectRef>
+      <a:fontRef idx="minor"/>
+    </dgm:style>
+  </dgm:styleLbl>
+  <dgm:styleLbl name="alignImgPlace1">
+    <dgm:scene3d>
+      <a:camera prst="orthographicFront"/>
+      <a:lightRig rig="threePt" dir="t"/>
+    </dgm:scene3d>
+    <dgm:sp3d/>
+    <dgm:txPr/>
+    <dgm:style>
+      <a:lnRef idx="2">
+        <a:scrgbClr r="0" g="0" b="0"/>
+      </a:lnRef>
+      <a:fillRef idx="1">
+        <a:scrgbClr r="0" g="0" b="0"/>
+      </a:fillRef>
+      <a:effectRef idx="0">
+        <a:scrgbClr r="0" g="0" b="0"/>
+      </a:effectRef>
+      <a:fontRef idx="minor"/>
+    </dgm:style>
+  </dgm:styleLbl>
+  <dgm:styleLbl name="bgImgPlace1">
+    <dgm:scene3d>
+      <a:camera prst="orthographicFront"/>
+      <a:lightRig rig="threePt" dir="t"/>
+    </dgm:scene3d>
+    <dgm:sp3d/>
+    <dgm:txPr/>
+    <dgm:style>
+      <a:lnRef idx="2">
+        <a:scrgbClr r="0" g="0" b="0"/>
+      </a:lnRef>
+      <a:fillRef idx="1">
+        <a:scrgbClr r="0" g="0" b="0"/>
+      </a:fillRef>
+      <a:effectRef idx="0">
+        <a:scrgbClr r="0" g="0" b="0"/>
+      </a:effectRef>
+      <a:fontRef idx="minor"/>
+    </dgm:style>
+  </dgm:styleLbl>
+  <dgm:styleLbl name="sibTrans2D1">
+    <dgm:scene3d>
+      <a:camera prst="orthographicFront"/>
+      <a:lightRig rig="threePt" dir="t"/>
+    </dgm:scene3d>
+    <dgm:sp3d/>
+    <dgm:txPr/>
+    <dgm:style>
+      <a:lnRef idx="0">
+        <a:scrgbClr r="0" g="0" b="0"/>
+      </a:lnRef>
+      <a:fillRef idx="1">
+        <a:scrgbClr r="0" g="0" b="0"/>
+      </a:fillRef>
+      <a:effectRef idx="0">
+        <a:scrgbClr r="0" g="0" b="0"/>
+      </a:effectRef>
+      <a:fontRef idx="minor">
+        <a:schemeClr val="lt1"/>
+      </a:fontRef>
+    </dgm:style>
+  </dgm:styleLbl>
+  <dgm:styleLbl name="fgSibTrans2D1">
+    <dgm:scene3d>
+      <a:camera prst="orthographicFront"/>
+      <a:lightRig rig="threePt" dir="t"/>
+    </dgm:scene3d>
+    <dgm:sp3d/>
+    <dgm:txPr/>
+    <dgm:style>
+      <a:lnRef idx="0">
+        <a:scrgbClr r="0" g="0" b="0"/>
+      </a:lnRef>
+      <a:fillRef idx="1">
+        <a:scrgbClr r="0" g="0" b="0"/>
+      </a:fillRef>
+      <a:effectRef idx="0">
+        <a:scrgbClr r="0" g="0" b="0"/>
+      </a:effectRef>
+      <a:fontRef idx="minor">
+        <a:schemeClr val="lt1"/>
+      </a:fontRef>
+    </dgm:style>
+  </dgm:styleLbl>
+  <dgm:styleLbl name="bgSibTrans2D1">
+    <dgm:scene3d>
+      <a:camera prst="orthographicFront"/>
+      <a:lightRig rig="threePt" dir="t"/>
+    </dgm:scene3d>
+    <dgm:sp3d/>
+    <dgm:txPr/>
+    <dgm:style>
+      <a:lnRef idx="0">
+        <a:scrgbClr r="0" g="0" b="0"/>
+      </a:lnRef>
+      <a:fillRef idx="1">
+        <a:scrgbClr r="0" g="0" b="0"/>
+      </a:fillRef>
+      <a:effectRef idx="0">
+        <a:scrgbClr r="0" g="0" b="0"/>
+      </a:effectRef>
+      <a:fontRef idx="minor">
+        <a:schemeClr val="lt1"/>
+      </a:fontRef>
+    </dgm:style>
+  </dgm:styleLbl>
+  <dgm:styleLbl name="sibTrans1D1">
+    <dgm:scene3d>
+      <a:camera prst="orthographicFront"/>
+      <a:lightRig rig="threePt" dir="t"/>
+    </dgm:scene3d>
+    <dgm:sp3d/>
+    <dgm:txPr/>
+    <dgm:style>
+      <a:lnRef idx="1">
+        <a:scrgbClr r="0" g="0" b="0"/>
+      </a:lnRef>
+      <a:fillRef idx="0">
+        <a:scrgbClr r="0" g="0" b="0"/>
+      </a:fillRef>
+      <a:effectRef idx="0">
+        <a:scrgbClr r="0" g="0" b="0"/>
+      </a:effectRef>
+      <a:fontRef idx="minor"/>
+    </dgm:style>
+  </dgm:styleLbl>
+  <dgm:styleLbl name="callout">
+    <dgm:scene3d>
+      <a:camera prst="orthographicFront"/>
+      <a:lightRig rig="threePt" dir="t"/>
+    </dgm:scene3d>
+    <dgm:sp3d/>
+    <dgm:txPr/>
+    <dgm:style>
+      <a:lnRef idx="2">
+        <a:scrgbClr r="0" g="0" b="0"/>
+      </a:lnRef>
+      <a:fillRef idx="1">
+        <a:scrgbClr r="0" g="0" b="0"/>
+      </a:fillRef>
+      <a:effectRef idx="0">
+        <a:scrgbClr r="0" g="0" b="0"/>
+      </a:effectRef>
+      <a:fontRef idx="minor"/>
+    </dgm:style>
+  </dgm:styleLbl>
+  <dgm:styleLbl name="asst0">
+    <dgm:scene3d>
+      <a:camera prst="orthographicFront"/>
+      <a:lightRig rig="threePt" dir="t"/>
+    </dgm:scene3d>
+    <dgm:sp3d/>
+    <dgm:txPr/>
+    <dgm:style>
+      <a:lnRef idx="2">
+        <a:scrgbClr r="0" g="0" b="0"/>
+      </a:lnRef>
+      <a:fillRef idx="1">
+        <a:scrgbClr r="0" g="0" b="0"/>
+      </a:fillRef>
+      <a:effectRef idx="0">
+        <a:scrgbClr r="0" g="0" b="0"/>
+      </a:effectRef>
+      <a:fontRef idx="minor">
+        <a:schemeClr val="lt1"/>
+      </a:fontRef>
+    </dgm:style>
+  </dgm:styleLbl>
+  <dgm:styleLbl name="asst1">
+    <dgm:scene3d>
+      <a:camera prst="orthographicFront"/>
+      <a:lightRig rig="threePt" dir="t"/>
+    </dgm:scene3d>
+    <dgm:sp3d/>
+    <dgm:txPr/>
+    <dgm:style>
+      <a:lnRef idx="2">
+        <a:scrgbClr r="0" g="0" b="0"/>
+      </a:lnRef>
+      <a:fillRef idx="1">
+        <a:scrgbClr r="0" g="0" b="0"/>
+      </a:fillRef>
+      <a:effectRef idx="0">
+        <a:scrgbClr r="0" g="0" b="0"/>
+      </a:effectRef>
+      <a:fontRef idx="minor">
+        <a:schemeClr val="lt1"/>
+      </a:fontRef>
+    </dgm:style>
+  </dgm:styleLbl>
+  <dgm:styleLbl name="asst2">
+    <dgm:scene3d>
+      <a:camera prst="orthographicFront"/>
+      <a:lightRig rig="threePt" dir="t"/>
+    </dgm:scene3d>
+    <dgm:sp3d/>
+    <dgm:txPr/>
+    <dgm:style>
+      <a:lnRef idx="2">
+        <a:scrgbClr r="0" g="0" b="0"/>
+      </a:lnRef>
+      <a:fillRef idx="1">
+        <a:scrgbClr r="0" g="0" b="0"/>
+      </a:fillRef>
+      <a:effectRef idx="0">
+        <a:scrgbClr r="0" g="0" b="0"/>
+      </a:effectRef>
+      <a:fontRef idx="minor">
+        <a:schemeClr val="lt1"/>
+      </a:fontRef>
+    </dgm:style>
+  </dgm:styleLbl>
+  <dgm:styleLbl name="asst3">
+    <dgm:scene3d>
+      <a:camera prst="orthographicFront"/>
+      <a:lightRig rig="threePt" dir="t"/>
+    </dgm:scene3d>
+    <dgm:sp3d/>
+    <dgm:txPr/>
+    <dgm:style>
+      <a:lnRef idx="2">
+        <a:scrgbClr r="0" g="0" b="0"/>
+      </a:lnRef>
+      <a:fillRef idx="1">
+        <a:scrgbClr r="0" g="0" b="0"/>
+      </a:fillRef>
+      <a:effectRef idx="0">
+        <a:scrgbClr r="0" g="0" b="0"/>
+      </a:effectRef>
+      <a:fontRef idx="minor">
+        <a:schemeClr val="lt1"/>
+      </a:fontRef>
+    </dgm:style>
+  </dgm:styleLbl>
+  <dgm:styleLbl name="asst4">
+    <dgm:scene3d>
+      <a:camera prst="orthographicFront"/>
+      <a:lightRig rig="threePt" dir="t"/>
+    </dgm:scene3d>
+    <dgm:sp3d/>
+    <dgm:txPr/>
+    <dgm:style>
+      <a:lnRef idx="2">
+        <a:scrgbClr r="0" g="0" b="0"/>
+      </a:lnRef>
+      <a:fillRef idx="1">
+        <a:scrgbClr r="0" g="0" b="0"/>
+      </a:fillRef>
+      <a:effectRef idx="0">
+        <a:scrgbClr r="0" g="0" b="0"/>
+      </a:effectRef>
+      <a:fontRef idx="minor">
+        <a:schemeClr val="lt1"/>
+      </a:fontRef>
+    </dgm:style>
+  </dgm:styleLbl>
+  <dgm:styleLbl name="parChTrans2D1">
+    <dgm:scene3d>
+      <a:camera prst="orthographicFront"/>
+      <a:lightRig rig="threePt" dir="t"/>
+    </dgm:scene3d>
+    <dgm:sp3d/>
+    <dgm:txPr/>
+    <dgm:style>
+      <a:lnRef idx="2">
+        <a:scrgbClr r="0" g="0" b="0"/>
+      </a:lnRef>
+      <a:fillRef idx="1">
+        <a:scrgbClr r="0" g="0" b="0"/>
+      </a:fillRef>
+      <a:effectRef idx="0">
+        <a:scrgbClr r="0" g="0" b="0"/>
+      </a:effectRef>
+      <a:fontRef idx="minor">
+        <a:schemeClr val="lt1"/>
+      </a:fontRef>
+    </dgm:style>
+  </dgm:styleLbl>
+  <dgm:styleLbl name="parChTrans2D2">
+    <dgm:scene3d>
+      <a:camera prst="orthographicFront"/>
+      <a:lightRig rig="threePt" dir="t"/>
+    </dgm:scene3d>
+    <dgm:sp3d/>
+    <dgm:txPr/>
+    <dgm:style>
+      <a:lnRef idx="2">
+        <a:scrgbClr r="0" g="0" b="0"/>
+      </a:lnRef>
+      <a:fillRef idx="1">
+        <a:scrgbClr r="0" g="0" b="0"/>
+      </a:fillRef>
+      <a:effectRef idx="0">
+        <a:scrgbClr r="0" g="0" b="0"/>
+      </a:effectRef>
+      <a:fontRef idx="minor">
+        <a:schemeClr val="lt1"/>
+      </a:fontRef>
+    </dgm:style>
+  </dgm:styleLbl>
+  <dgm:styleLbl name="parChTrans2D3">
+    <dgm:scene3d>
+      <a:camera prst="orthographicFront"/>
+      <a:lightRig rig="threePt" dir="t"/>
+    </dgm:scene3d>
+    <dgm:sp3d/>
+    <dgm:txPr/>
+    <dgm:style>
+      <a:lnRef idx="2">
+        <a:scrgbClr r="0" g="0" b="0"/>
+      </a:lnRef>
+      <a:fillRef idx="1">
+        <a:scrgbClr r="0" g="0" b="0"/>
+      </a:fillRef>
+      <a:effectRef idx="0">
+        <a:scrgbClr r="0" g="0" b="0"/>
+      </a:effectRef>
+      <a:fontRef idx="minor">
+        <a:schemeClr val="lt1"/>
+      </a:fontRef>
+    </dgm:style>
+  </dgm:styleLbl>
+  <dgm:styleLbl name="parChTrans2D4">
+    <dgm:scene3d>
+      <a:camera prst="orthographicFront"/>
+      <a:lightRig rig="threePt" dir="t"/>
+    </dgm:scene3d>
+    <dgm:sp3d/>
+    <dgm:txPr/>
+    <dgm:style>
+      <a:lnRef idx="2">
+        <a:scrgbClr r="0" g="0" b="0"/>
+      </a:lnRef>
+      <a:fillRef idx="1">
+        <a:scrgbClr r="0" g="0" b="0"/>
+      </a:fillRef>
+      <a:effectRef idx="0">
+        <a:scrgbClr r="0" g="0" b="0"/>
+      </a:effectRef>
+      <a:fontRef idx="minor">
+        <a:schemeClr val="lt1"/>
+      </a:fontRef>
+    </dgm:style>
+  </dgm:styleLbl>
+  <dgm:styleLbl name="parChTrans1D1">
+    <dgm:scene3d>
+      <a:camera prst="orthographicFront"/>
+      <a:lightRig rig="threePt" dir="t"/>
+    </dgm:scene3d>
+    <dgm:sp3d/>
+    <dgm:txPr/>
+    <dgm:style>
+      <a:lnRef idx="2">
+        <a:scrgbClr r="0" g="0" b="0"/>
+      </a:lnRef>
+      <a:fillRef idx="0">
+        <a:scrgbClr r="0" g="0" b="0"/>
+      </a:fillRef>
+      <a:effectRef idx="0">
+        <a:scrgbClr r="0" g="0" b="0"/>
+      </a:effectRef>
+      <a:fontRef idx="minor"/>
+    </dgm:style>
+  </dgm:styleLbl>
+  <dgm:styleLbl name="parChTrans1D2">
+    <dgm:scene3d>
+      <a:camera prst="orthographicFront"/>
+      <a:lightRig rig="threePt" dir="t"/>
+    </dgm:scene3d>
+    <dgm:sp3d/>
+    <dgm:txPr/>
+    <dgm:style>
+      <a:lnRef idx="2">
+        <a:scrgbClr r="0" g="0" b="0"/>
+      </a:lnRef>
+      <a:fillRef idx="0">
+        <a:scrgbClr r="0" g="0" b="0"/>
+      </a:fillRef>
+      <a:effectRef idx="0">
+        <a:scrgbClr r="0" g="0" b="0"/>
+      </a:effectRef>
+      <a:fontRef idx="minor"/>
+    </dgm:style>
+  </dgm:styleLbl>
+  <dgm:styleLbl name="parChTrans1D3">
+    <dgm:scene3d>
+      <a:camera prst="orthographicFront"/>
+      <a:lightRig rig="threePt" dir="t"/>
+    </dgm:scene3d>
+    <dgm:sp3d/>
+    <dgm:txPr/>
+    <dgm:style>
+      <a:lnRef idx="2">
+        <a:scrgbClr r="0" g="0" b="0"/>
+      </a:lnRef>
+      <a:fillRef idx="0">
+        <a:scrgbClr r="0" g="0" b="0"/>
+      </a:fillRef>
+      <a:effectRef idx="0">
+        <a:scrgbClr r="0" g="0" b="0"/>
+      </a:effectRef>
+      <a:fontRef idx="minor"/>
+    </dgm:style>
+  </dgm:styleLbl>
+  <dgm:styleLbl name="parChTrans1D4">
+    <dgm:scene3d>
+      <a:camera prst="orthographicFront"/>
+      <a:lightRig rig="threePt" dir="t"/>
+    </dgm:scene3d>
+    <dgm:sp3d/>
+    <dgm:txPr/>
+    <dgm:style>
+      <a:lnRef idx="2">
+        <a:scrgbClr r="0" g="0" b="0"/>
+      </a:lnRef>
+      <a:fillRef idx="0">
+        <a:scrgbClr r="0" g="0" b="0"/>
+      </a:fillRef>
+      <a:effectRef idx="0">
+        <a:scrgbClr r="0" g="0" b="0"/>
+      </a:effectRef>
+      <a:fontRef idx="minor"/>
+    </dgm:style>
+  </dgm:styleLbl>
+  <dgm:styleLbl name="fgAcc1">
+    <dgm:scene3d>
+      <a:camera prst="orthographicFront"/>
+      <a:lightRig rig="threePt" dir="t"/>
+    </dgm:scene3d>
+    <dgm:sp3d/>
+    <dgm:txPr/>
+    <dgm:style>
+      <a:lnRef idx="2">
+        <a:scrgbClr r="0" g="0" b="0"/>
+      </a:lnRef>
+      <a:fillRef idx="1">
+        <a:scrgbClr r="0" g="0" b="0"/>
+      </a:fillRef>
+      <a:effectRef idx="0">
+        <a:scrgbClr r="0" g="0" b="0"/>
+      </a:effectRef>
+      <a:fontRef idx="minor"/>
+    </dgm:style>
+  </dgm:styleLbl>
+  <dgm:styleLbl name="conFgAcc1">
+    <dgm:scene3d>
+      <a:camera prst="orthographicFront"/>
+      <a:lightRig rig="threePt" dir="t"/>
+    </dgm:scene3d>
+    <dgm:sp3d/>
+    <dgm:txPr/>
+    <dgm:style>
+      <a:lnRef idx="2">
+        <a:scrgbClr r="0" g="0" b="0"/>
+      </a:lnRef>
+      <a:fillRef idx="1">
+        <a:scrgbClr r="0" g="0" b="0"/>
+      </a:fillRef>
+      <a:effectRef idx="0">
+        <a:scrgbClr r="0" g="0" b="0"/>
+      </a:effectRef>
+      <a:fontRef idx="minor"/>
+    </dgm:style>
+  </dgm:styleLbl>
+  <dgm:styleLbl name="alignAcc1">
+    <dgm:scene3d>
+      <a:camera prst="orthographicFront"/>
+      <a:lightRig rig="threePt" dir="t"/>
+    </dgm:scene3d>
+    <dgm:sp3d/>
+    <dgm:txPr/>
+    <dgm:style>
+      <a:lnRef idx="2">
+        <a:scrgbClr r="0" g="0" b="0"/>
+      </a:lnRef>
+      <a:fillRef idx="1">
+        <a:scrgbClr r="0" g="0" b="0"/>
+      </a:fillRef>
+      <a:effectRef idx="0">
+        <a:scrgbClr r="0" g="0" b="0"/>
+      </a:effectRef>
+      <a:fontRef idx="minor"/>
+    </dgm:style>
+  </dgm:styleLbl>
+  <dgm:styleLbl name="trAlignAcc1">
+    <dgm:scene3d>
+      <a:camera prst="orthographicFront"/>
+      <a:lightRig rig="threePt" dir="t"/>
+    </dgm:scene3d>
+    <dgm:sp3d/>
+    <dgm:txPr/>
+    <dgm:style>
+      <a:lnRef idx="1">
+        <a:scrgbClr r="0" g="0" b="0"/>
+      </a:lnRef>
+      <a:fillRef idx="1">
+        <a:scrgbClr r="0" g="0" b="0"/>
+      </a:fillRef>
+      <a:effectRef idx="0">
+        <a:scrgbClr r="0" g="0" b="0"/>
+      </a:effectRef>
+      <a:fontRef idx="minor"/>
+    </dgm:style>
+  </dgm:styleLbl>
+  <dgm:styleLbl name="bgAcc1">
+    <dgm:scene3d>
+      <a:camera prst="orthographicFront"/>
+      <a:lightRig rig="threePt" dir="t"/>
+    </dgm:scene3d>
+    <dgm:sp3d/>
+    <dgm:txPr/>
+    <dgm:style>
+      <a:lnRef idx="2">
+        <a:scrgbClr r="0" g="0" b="0"/>
+      </a:lnRef>
+      <a:fillRef idx="1">
+        <a:scrgbClr r="0" g="0" b="0"/>
+      </a:fillRef>
+      <a:effectRef idx="0">
+        <a:scrgbClr r="0" g="0" b="0"/>
+      </a:effectRef>
+      <a:fontRef idx="minor"/>
+    </dgm:style>
+  </dgm:styleLbl>
+  <dgm:styleLbl name="solidFgAcc1">
+    <dgm:scene3d>
+      <a:camera prst="orthographicFront"/>
+      <a:lightRig rig="threePt" dir="t"/>
+    </dgm:scene3d>
+    <dgm:sp3d/>
+    <dgm:txPr/>
+    <dgm:style>
+      <a:lnRef idx="2">
+        <a:scrgbClr r="0" g="0" b="0"/>
+      </a:lnRef>
+      <a:fillRef idx="1">
+        <a:scrgbClr r="0" g="0" b="0"/>
+      </a:fillRef>
+      <a:effectRef idx="0">
+        <a:scrgbClr r="0" g="0" b="0"/>
+      </a:effectRef>
+      <a:fontRef idx="minor"/>
+    </dgm:style>
+  </dgm:styleLbl>
+  <dgm:styleLbl name="solidAlignAcc1">
+    <dgm:scene3d>
+      <a:camera prst="orthographicFront"/>
+      <a:lightRig rig="threePt" dir="t"/>
+    </dgm:scene3d>
+    <dgm:sp3d/>
+    <dgm:txPr/>
+    <dgm:style>
+      <a:lnRef idx="2">
+        <a:scrgbClr r="0" g="0" b="0"/>
+      </a:lnRef>
+      <a:fillRef idx="1">
+        <a:scrgbClr r="0" g="0" b="0"/>
+      </a:fillRef>
+      <a:effectRef idx="0">
+        <a:scrgbClr r="0" g="0" b="0"/>
+      </a:effectRef>
+      <a:fontRef idx="minor"/>
+    </dgm:style>
+  </dgm:styleLbl>
+  <dgm:styleLbl name="solidBgAcc1">
+    <dgm:scene3d>
+      <a:camera prst="orthographicFront"/>
+      <a:lightRig rig="threePt" dir="t"/>
+    </dgm:scene3d>
+    <dgm:sp3d/>
+    <dgm:txPr/>
+    <dgm:style>
+      <a:lnRef idx="2">
+        <a:scrgbClr r="0" g="0" b="0"/>
+      </a:lnRef>
+      <a:fillRef idx="1">
+        <a:scrgbClr r="0" g="0" b="0"/>
+      </a:fillRef>
+      <a:effectRef idx="0">
+        <a:scrgbClr r="0" g="0" b="0"/>
+      </a:effectRef>
+      <a:fontRef idx="minor"/>
+    </dgm:style>
+  </dgm:styleLbl>
+  <dgm:styleLbl name="fgAccFollowNode1">
+    <dgm:scene3d>
+      <a:camera prst="orthographicFront"/>
+      <a:lightRig rig="threePt" dir="t"/>
+    </dgm:scene3d>
+    <dgm:sp3d/>
+    <dgm:txPr/>
+    <dgm:style>
+      <a:lnRef idx="2">
+        <a:scrgbClr r="0" g="0" b="0"/>
+      </a:lnRef>
+      <a:fillRef idx="1">
+        <a:scrgbClr r="0" g="0" b="0"/>
+      </a:fillRef>
+      <a:effectRef idx="0">
+        <a:scrgbClr r="0" g="0" b="0"/>
+      </a:effectRef>
+      <a:fontRef idx="minor"/>
+    </dgm:style>
+  </dgm:styleLbl>
+  <dgm:styleLbl name="alignAccFollowNode1">
+    <dgm:scene3d>
+      <a:camera prst="orthographicFront"/>
+      <a:lightRig rig="threePt" dir="t"/>
+    </dgm:scene3d>
+    <dgm:sp3d/>
+    <dgm:txPr/>
+    <dgm:style>
+      <a:lnRef idx="2">
+        <a:scrgbClr r="0" g="0" b="0"/>
+      </a:lnRef>
+      <a:fillRef idx="1">
+        <a:scrgbClr r="0" g="0" b="0"/>
+      </a:fillRef>
+      <a:effectRef idx="0">
+        <a:scrgbClr r="0" g="0" b="0"/>
+      </a:effectRef>
+      <a:fontRef idx="minor"/>
+    </dgm:style>
+  </dgm:styleLbl>
+  <dgm:styleLbl name="bgAccFollowNode1">
+    <dgm:scene3d>
+      <a:camera prst="orthographicFront"/>
+      <a:lightRig rig="threePt" dir="t"/>
+    </dgm:scene3d>
+    <dgm:sp3d/>
+    <dgm:txPr/>
+    <dgm:style>
+      <a:lnRef idx="2">
+        <a:scrgbClr r="0" g="0" b="0"/>
+      </a:lnRef>
+      <a:fillRef idx="1">
+        <a:scrgbClr r="0" g="0" b="0"/>
+      </a:fillRef>
+      <a:effectRef idx="0">
+        <a:scrgbClr r="0" g="0" b="0"/>
+      </a:effectRef>
+      <a:fontRef idx="minor"/>
+    </dgm:style>
+  </dgm:styleLbl>
+  <dgm:styleLbl name="fgAcc0">
+    <dgm:scene3d>
+      <a:camera prst="orthographicFront"/>
+      <a:lightRig rig="threePt" dir="t"/>
+    </dgm:scene3d>
+    <dgm:sp3d/>
+    <dgm:txPr/>
+    <dgm:style>
+      <a:lnRef idx="2">
+        <a:scrgbClr r="0" g="0" b="0"/>
+      </a:lnRef>
+      <a:fillRef idx="1">
+        <a:scrgbClr r="0" g="0" b="0"/>
+      </a:fillRef>
+      <a:effectRef idx="0">
+        <a:scrgbClr r="0" g="0" b="0"/>
+      </a:effectRef>
+      <a:fontRef idx="minor"/>
+    </dgm:style>
+  </dgm:styleLbl>
+  <dgm:styleLbl name="fgAcc2">
+    <dgm:scene3d>
+      <a:camera prst="orthographicFront"/>
+      <a:lightRig rig="threePt" dir="t"/>
+    </dgm:scene3d>
+    <dgm:sp3d/>
+    <dgm:txPr/>
+    <dgm:style>
+      <a:lnRef idx="2">
+        <a:scrgbClr r="0" g="0" b="0"/>
+      </a:lnRef>
+      <a:fillRef idx="1">
+        <a:scrgbClr r="0" g="0" b="0"/>
+      </a:fillRef>
+      <a:effectRef idx="0">
+        <a:scrgbClr r="0" g="0" b="0"/>
+      </a:effectRef>
+      <a:fontRef idx="minor"/>
+    </dgm:style>
+  </dgm:styleLbl>
+  <dgm:styleLbl name="fgAcc3">
+    <dgm:scene3d>
+      <a:camera prst="orthographicFront"/>
+      <a:lightRig rig="threePt" dir="t"/>
+    </dgm:scene3d>
+    <dgm:sp3d/>
+    <dgm:txPr/>
+    <dgm:style>
+      <a:lnRef idx="2">
+        <a:scrgbClr r="0" g="0" b="0"/>
+      </a:lnRef>
+      <a:fillRef idx="1">
+        <a:scrgbClr r="0" g="0" b="0"/>
+      </a:fillRef>
+      <a:effectRef idx="0">
+        <a:scrgbClr r="0" g="0" b="0"/>
+      </a:effectRef>
+      <a:fontRef idx="minor"/>
+    </dgm:style>
+  </dgm:styleLbl>
+  <dgm:styleLbl name="fgAcc4">
+    <dgm:scene3d>
+      <a:camera prst="orthographicFront"/>
+      <a:lightRig rig="threePt" dir="t"/>
+    </dgm:scene3d>
+    <dgm:sp3d/>
+    <dgm:txPr/>
+    <dgm:style>
+      <a:lnRef idx="2">
+        <a:scrgbClr r="0" g="0" b="0"/>
+      </a:lnRef>
+      <a:fillRef idx="1">
+        <a:scrgbClr r="0" g="0" b="0"/>
+      </a:fillRef>
+      <a:effectRef idx="0">
+        <a:scrgbClr r="0" g="0" b="0"/>
+      </a:effectRef>
+      <a:fontRef idx="minor"/>
+    </dgm:style>
+  </dgm:styleLbl>
+  <dgm:styleLbl name="bgShp">
+    <dgm:scene3d>
+      <a:camera prst="orthographicFront"/>
+      <a:lightRig rig="threePt" dir="t"/>
+    </dgm:scene3d>
+    <dgm:sp3d/>
+    <dgm:txPr/>
+    <dgm:style>
+      <a:lnRef idx="0">
+        <a:scrgbClr r="0" g="0" b="0"/>
+      </a:lnRef>
+      <a:fillRef idx="1">
+        <a:scrgbClr r="0" g="0" b="0"/>
+      </a:fillRef>
+      <a:effectRef idx="0">
+        <a:scrgbClr r="0" g="0" b="0"/>
+      </a:effectRef>
+      <a:fontRef idx="minor"/>
+    </dgm:style>
+  </dgm:styleLbl>
+  <dgm:styleLbl name="dkBgShp">
+    <dgm:scene3d>
+      <a:camera prst="orthographicFront"/>
+      <a:lightRig rig="threePt" dir="t"/>
+    </dgm:scene3d>
+    <dgm:sp3d/>
+    <dgm:txPr/>
+    <dgm:style>
+      <a:lnRef idx="0">
+        <a:scrgbClr r="0" g="0" b="0"/>
+      </a:lnRef>
+      <a:fillRef idx="1">
+        <a:scrgbClr r="0" g="0" b="0"/>
+      </a:fillRef>
+      <a:effectRef idx="0">
+        <a:scrgbClr r="0" g="0" b="0"/>
+      </a:effectRef>
+      <a:fontRef idx="minor"/>
+    </dgm:style>
+  </dgm:styleLbl>
+  <dgm:styleLbl name="trBgShp">
+    <dgm:scene3d>
+      <a:camera prst="orthographicFront"/>
+      <a:lightRig rig="threePt" dir="t"/>
+    </dgm:scene3d>
+    <dgm:sp3d/>
+    <dgm:txPr/>
+    <dgm:style>
+      <a:lnRef idx="0">
+        <a:scrgbClr r="0" g="0" b="0"/>
+      </a:lnRef>
+      <a:fillRef idx="1">
+        <a:scrgbClr r="0" g="0" b="0"/>
+      </a:fillRef>
+      <a:effectRef idx="0">
+        <a:scrgbClr r="0" g="0" b="0"/>
+      </a:effectRef>
+      <a:fontRef idx="minor"/>
+    </dgm:style>
+  </dgm:styleLbl>
+  <dgm:styleLbl name="fgShp">
+    <dgm:scene3d>
+      <a:camera prst="orthographicFront"/>
+      <a:lightRig rig="threePt" dir="t"/>
+    </dgm:scene3d>
+    <dgm:sp3d/>
+    <dgm:txPr/>
+    <dgm:style>
+      <a:lnRef idx="2">
+        <a:scrgbClr r="0" g="0" b="0"/>
+      </a:lnRef>
+      <a:fillRef idx="1">
+        <a:scrgbClr r="0" g="0" b="0"/>
+      </a:fillRef>
+      <a:effectRef idx="0">
+        <a:scrgbClr r="0" g="0" b="0"/>
+      </a:effectRef>
+      <a:fontRef idx="minor"/>
+    </dgm:style>
+  </dgm:styleLbl>
+  <dgm:styleLbl name="revTx">
+    <dgm:scene3d>
+      <a:camera prst="orthographicFront"/>
+      <a:lightRig rig="threePt" dir="t"/>
+    </dgm:scene3d>
+    <dgm:sp3d/>
+    <dgm:txPr/>
+    <dgm:style>
+      <a:lnRef idx="0">
+        <a:scrgbClr r="0" g="0" b="0"/>
+      </a:lnRef>
+      <a:fillRef idx="0">
+        <a:scrgbClr r="0" g="0" b="0"/>
+      </a:fillRef>
+      <a:effectRef idx="0">
+        <a:scrgbClr r="0" g="0" b="0"/>
+      </a:effectRef>
+      <a:fontRef idx="minor"/>
+    </dgm:style>
+  </dgm:styleLbl>
+</dgm:styleDef>
 </file>
 
 <file path=ppt/slideLayouts/slideLayout1.xml><?xml version="1.0" encoding="utf-8"?>
@@ -4617,7 +7775,7 @@
                 <a:ea typeface="Times New Roman" panose="02020603050405020304" pitchFamily="18" charset="0"/>
                 <a:cs typeface="Times New Roman" panose="02020603050405020304" pitchFamily="18" charset="0"/>
               </a:rPr>
-              <a:t>Formato de la entidad</a:t>
+              <a:t>Formato de la entidad + </a:t>
             </a:r>
           </a:p>
           <a:p>
@@ -5610,6 +8768,70 @@
               <a:t>ARQUITECTURA PROPUESTA </a:t>
             </a:r>
             <a:endParaRPr lang="es-MX" sz="3600" dirty="0"/>
+          </a:p>
+        </p:txBody>
+      </p:sp>
+      <p:graphicFrame>
+        <p:nvGraphicFramePr>
+          <p:cNvPr id="5" name="Diagrama 4">
+            <a:extLst>
+              <a:ext uri="{FF2B5EF4-FFF2-40B4-BE49-F238E27FC236}">
+                <a16:creationId xmlns:a16="http://schemas.microsoft.com/office/drawing/2014/main" id="{84BC4732-CBBD-E997-EE9F-0EB65962C4CD}"/>
+              </a:ext>
+            </a:extLst>
+          </p:cNvPr>
+          <p:cNvGraphicFramePr/>
+          <p:nvPr>
+            <p:extLst>
+              <p:ext uri="{D42A27DB-BD31-4B8C-83A1-F6EECF244321}">
+                <p14:modId xmlns:p14="http://schemas.microsoft.com/office/powerpoint/2010/main" val="69262250"/>
+              </p:ext>
+            </p:extLst>
+          </p:nvPr>
+        </p:nvGraphicFramePr>
+        <p:xfrm>
+          <a:off x="1064333" y="719666"/>
+          <a:ext cx="9508971" cy="5418667"/>
+        </p:xfrm>
+        <a:graphic>
+          <a:graphicData uri="http://schemas.openxmlformats.org/drawingml/2006/diagram">
+            <dgm:relIds xmlns:dgm="http://schemas.openxmlformats.org/drawingml/2006/diagram" xmlns:r="http://schemas.openxmlformats.org/officeDocument/2006/relationships" r:dm="rId2" r:lo="rId3" r:qs="rId4" r:cs="rId5"/>
+          </a:graphicData>
+        </a:graphic>
+      </p:graphicFrame>
+      <p:sp>
+        <p:nvSpPr>
+          <p:cNvPr id="6" name="CuadroTexto 5">
+            <a:extLst>
+              <a:ext uri="{FF2B5EF4-FFF2-40B4-BE49-F238E27FC236}">
+                <a16:creationId xmlns:a16="http://schemas.microsoft.com/office/drawing/2014/main" id="{7AE03C13-F831-CD26-534A-D004468FD6A8}"/>
+              </a:ext>
+            </a:extLst>
+          </p:cNvPr>
+          <p:cNvSpPr txBox="1"/>
+          <p:nvPr/>
+        </p:nvSpPr>
+        <p:spPr>
+          <a:xfrm>
+            <a:off x="186431" y="5388746"/>
+            <a:ext cx="7004482" cy="646331"/>
+          </a:xfrm>
+          <a:prstGeom prst="rect">
+            <a:avLst/>
+          </a:prstGeom>
+          <a:noFill/>
+        </p:spPr>
+        <p:txBody>
+          <a:bodyPr wrap="square" rtlCol="0">
+            <a:spAutoFit/>
+          </a:bodyPr>
+          <a:lstStyle/>
+          <a:p>
+            <a:r>
+              <a:rPr lang="es-ES" dirty="0"/>
+              <a:t>Repo GitHub con la propuesta: https://github.com/arodriguez2222/materialPublicitarioPOP</a:t>
+            </a:r>
+            <a:endParaRPr lang="es-MX" dirty="0"/>
           </a:p>
         </p:txBody>
       </p:sp>

</xml_diff>